<commit_message>
bo sung bao cao
</commit_message>
<xml_diff>
--- a/bao cao/Slide Bao Cao.pptx
+++ b/bao cao/Slide Bao Cao.pptx
@@ -110,6 +110,22 @@
       </a:defRPr>
     </a:lvl9pPr>
   </p:defaultTextStyle>
+  <p:extLst>
+    <p:ext uri="{EFAFB233-063F-42B5-8137-9DF3F51BA10A}">
+      <p15:sldGuideLst xmlns:p15="http://schemas.microsoft.com/office/powerpoint/2012/main">
+        <p15:guide id="1" orient="horz" pos="2160">
+          <p15:clr>
+            <a:srgbClr val="A4A3A4"/>
+          </p15:clr>
+        </p15:guide>
+        <p15:guide id="2" pos="2880">
+          <p15:clr>
+            <a:srgbClr val="A4A3A4"/>
+          </p15:clr>
+        </p15:guide>
+      </p15:sldGuideLst>
+    </p:ext>
+  </p:extLst>
 </p:presentation>
 </file>
 
@@ -294,7 +310,7 @@
           <a:p>
             <a:fld id="{0161BABB-F365-4A74-9F23-FCA7B84113A8}" type="datetimeFigureOut">
               <a:rPr lang="en-US" smtClean="0"/>
-              <a:t>06/12/2019</a:t>
+              <a:t>11/12/2019</a:t>
             </a:fld>
             <a:endParaRPr lang="en-US"/>
           </a:p>
@@ -464,7 +480,7 @@
           <a:p>
             <a:fld id="{0161BABB-F365-4A74-9F23-FCA7B84113A8}" type="datetimeFigureOut">
               <a:rPr lang="en-US" smtClean="0"/>
-              <a:t>06/12/2019</a:t>
+              <a:t>11/12/2019</a:t>
             </a:fld>
             <a:endParaRPr lang="en-US"/>
           </a:p>
@@ -644,7 +660,7 @@
           <a:p>
             <a:fld id="{0161BABB-F365-4A74-9F23-FCA7B84113A8}" type="datetimeFigureOut">
               <a:rPr lang="en-US" smtClean="0"/>
-              <a:t>06/12/2019</a:t>
+              <a:t>11/12/2019</a:t>
             </a:fld>
             <a:endParaRPr lang="en-US"/>
           </a:p>
@@ -814,7 +830,7 @@
           <a:p>
             <a:fld id="{0161BABB-F365-4A74-9F23-FCA7B84113A8}" type="datetimeFigureOut">
               <a:rPr lang="en-US" smtClean="0"/>
-              <a:t>06/12/2019</a:t>
+              <a:t>11/12/2019</a:t>
             </a:fld>
             <a:endParaRPr lang="en-US"/>
           </a:p>
@@ -1060,7 +1076,7 @@
           <a:p>
             <a:fld id="{0161BABB-F365-4A74-9F23-FCA7B84113A8}" type="datetimeFigureOut">
               <a:rPr lang="en-US" smtClean="0"/>
-              <a:t>06/12/2019</a:t>
+              <a:t>11/12/2019</a:t>
             </a:fld>
             <a:endParaRPr lang="en-US"/>
           </a:p>
@@ -1348,7 +1364,7 @@
           <a:p>
             <a:fld id="{0161BABB-F365-4A74-9F23-FCA7B84113A8}" type="datetimeFigureOut">
               <a:rPr lang="en-US" smtClean="0"/>
-              <a:t>06/12/2019</a:t>
+              <a:t>11/12/2019</a:t>
             </a:fld>
             <a:endParaRPr lang="en-US"/>
           </a:p>
@@ -1770,7 +1786,7 @@
           <a:p>
             <a:fld id="{0161BABB-F365-4A74-9F23-FCA7B84113A8}" type="datetimeFigureOut">
               <a:rPr lang="en-US" smtClean="0"/>
-              <a:t>06/12/2019</a:t>
+              <a:t>11/12/2019</a:t>
             </a:fld>
             <a:endParaRPr lang="en-US"/>
           </a:p>
@@ -1888,7 +1904,7 @@
           <a:p>
             <a:fld id="{0161BABB-F365-4A74-9F23-FCA7B84113A8}" type="datetimeFigureOut">
               <a:rPr lang="en-US" smtClean="0"/>
-              <a:t>06/12/2019</a:t>
+              <a:t>11/12/2019</a:t>
             </a:fld>
             <a:endParaRPr lang="en-US"/>
           </a:p>
@@ -1983,7 +1999,7 @@
           <a:p>
             <a:fld id="{0161BABB-F365-4A74-9F23-FCA7B84113A8}" type="datetimeFigureOut">
               <a:rPr lang="en-US" smtClean="0"/>
-              <a:t>06/12/2019</a:t>
+              <a:t>11/12/2019</a:t>
             </a:fld>
             <a:endParaRPr lang="en-US"/>
           </a:p>
@@ -2260,7 +2276,7 @@
           <a:p>
             <a:fld id="{0161BABB-F365-4A74-9F23-FCA7B84113A8}" type="datetimeFigureOut">
               <a:rPr lang="en-US" smtClean="0"/>
-              <a:t>06/12/2019</a:t>
+              <a:t>11/12/2019</a:t>
             </a:fld>
             <a:endParaRPr lang="en-US"/>
           </a:p>
@@ -2513,7 +2529,7 @@
           <a:p>
             <a:fld id="{0161BABB-F365-4A74-9F23-FCA7B84113A8}" type="datetimeFigureOut">
               <a:rPr lang="en-US" smtClean="0"/>
-              <a:t>06/12/2019</a:t>
+              <a:t>11/12/2019</a:t>
             </a:fld>
             <a:endParaRPr lang="en-US"/>
           </a:p>
@@ -2585,7 +2601,7 @@
           </a:blip>
           <a:srcRect/>
           <a:stretch>
-            <a:fillRect t="-3000" b="-3000"/>
+            <a:fillRect l="-6000" r="-6000"/>
           </a:stretch>
         </a:blipFill>
         <a:effectLst/>
@@ -2735,7 +2751,7 @@
           <a:p>
             <a:fld id="{0161BABB-F365-4A74-9F23-FCA7B84113A8}" type="datetimeFigureOut">
               <a:rPr lang="en-US" smtClean="0"/>
-              <a:t>06/12/2019</a:t>
+              <a:t>11/12/2019</a:t>
             </a:fld>
             <a:endParaRPr lang="en-US"/>
           </a:p>
@@ -3173,6 +3189,16 @@
               <a:buNone/>
             </a:pPr>
             <a:r>
+              <a:rPr lang="en-US" sz="3600" b="1" smtClean="0">
+                <a:solidFill>
+                  <a:srgbClr val="FF0000"/>
+                </a:solidFill>
+                <a:latin typeface="Arial" pitchFamily="34" charset="0"/>
+                <a:cs typeface="Arial" pitchFamily="34" charset="0"/>
+              </a:rPr>
+              <a:t>ĐỀ TÀI</a:t>
+            </a:r>
+            <a:r>
               <a:rPr lang="en-US" sz="2800" b="1" smtClean="0">
                 <a:solidFill>
                   <a:srgbClr val="FF0000"/>
@@ -3180,7 +3206,7 @@
                 <a:latin typeface="Arial" pitchFamily="34" charset="0"/>
                 <a:cs typeface="Arial" pitchFamily="34" charset="0"/>
               </a:rPr>
-              <a:t>ĐỀ TÀI</a:t>
+              <a:t/>
             </a:r>
             <a:br>
               <a:rPr lang="en-US" sz="2800" b="1" smtClean="0">
@@ -3248,7 +3274,7 @@
         </p:blipFill>
         <p:spPr>
           <a:xfrm>
-            <a:off x="4038600" y="1371600"/>
+            <a:off x="4010994" y="1143001"/>
             <a:ext cx="1371600" cy="1371600"/>
           </a:xfrm>
           <a:prstGeom prst="rect">
@@ -3266,7 +3292,7 @@
         </p:nvSpPr>
         <p:spPr>
           <a:xfrm>
-            <a:off x="609600" y="381000"/>
+            <a:off x="609600" y="1"/>
             <a:ext cx="8229600" cy="1143000"/>
           </a:xfrm>
           <a:prstGeom prst="rect">
@@ -3344,7 +3370,7 @@
         </p:nvSpPr>
         <p:spPr>
           <a:xfrm>
-            <a:off x="4267201" y="4953000"/>
+            <a:off x="4343400" y="5100282"/>
             <a:ext cx="3200400" cy="1454727"/>
           </a:xfrm>
           <a:prstGeom prst="rect">
@@ -3424,6 +3450,13 @@
   <p:clrMapOvr>
     <a:masterClrMapping/>
   </p:clrMapOvr>
+  <p:timing>
+    <p:tnLst>
+      <p:par>
+        <p:cTn id="1" dur="indefinite" restart="never" nodeType="tmRoot"/>
+      </p:par>
+    </p:tnLst>
+  </p:timing>
 </p:sld>
 </file>
 
@@ -3544,6 +3577,13 @@
   <p:clrMapOvr>
     <a:masterClrMapping/>
   </p:clrMapOvr>
+  <p:timing>
+    <p:tnLst>
+      <p:par>
+        <p:cTn id="1" dur="indefinite" restart="never" nodeType="tmRoot"/>
+      </p:par>
+    </p:tnLst>
+  </p:timing>
 </p:sld>
 </file>
 
@@ -3777,6 +3817,13 @@
   <p:clrMapOvr>
     <a:masterClrMapping/>
   </p:clrMapOvr>
+  <p:timing>
+    <p:tnLst>
+      <p:par>
+        <p:cTn id="1" dur="indefinite" restart="never" nodeType="tmRoot"/>
+      </p:par>
+    </p:tnLst>
+  </p:timing>
 </p:sld>
 </file>
 
@@ -3827,27 +3874,7 @@
                 <a:latin typeface="Arial" pitchFamily="34" charset="0"/>
                 <a:cs typeface="Arial" pitchFamily="34" charset="0"/>
               </a:rPr>
-              <a:t>II. NỘI DUNG, </a:t>
-            </a:r>
-            <a:r>
-              <a:rPr lang="en-US" b="1" smtClean="0">
-                <a:solidFill>
-                  <a:srgbClr val="FF0000"/>
-                </a:solidFill>
-                <a:latin typeface="Arial" pitchFamily="34" charset="0"/>
-                <a:cs typeface="Arial" pitchFamily="34" charset="0"/>
-              </a:rPr>
-              <a:t>ĐỐI TƯỢNG, </a:t>
-            </a:r>
-            <a:r>
-              <a:rPr lang="en-US" b="1" smtClean="0">
-                <a:solidFill>
-                  <a:srgbClr val="FF0000"/>
-                </a:solidFill>
-                <a:latin typeface="Arial" pitchFamily="34" charset="0"/>
-                <a:cs typeface="Arial" pitchFamily="34" charset="0"/>
-              </a:rPr>
-              <a:t>PHƯƠNG PHÁP NGHIÊN CỨU</a:t>
+              <a:t>II. NỘI DUNG, ĐỐI TƯỢNG, PHƯƠNG PHÁP NGHIÊN CỨU</a:t>
             </a:r>
             <a:endParaRPr lang="en-US" b="1">
               <a:solidFill>
@@ -3911,14 +3938,7 @@
                 <a:latin typeface="Arial" pitchFamily="34" charset="0"/>
                 <a:cs typeface="Arial" pitchFamily="34" charset="0"/>
               </a:rPr>
-              <a:t>dung nghiên cứu của đề tài chủ yếu tập trung vào việc quản lý ban cán </a:t>
-            </a:r>
-            <a:r>
-              <a:rPr lang="en-US">
-                <a:latin typeface="Arial" pitchFamily="34" charset="0"/>
-                <a:cs typeface="Arial" pitchFamily="34" charset="0"/>
-              </a:rPr>
-              <a:t>sự </a:t>
+              <a:t>dung nghiên cứu của đề tài chủ yếu tập trung vào việc quản lý ban cán sự </a:t>
             </a:r>
             <a:r>
               <a:rPr lang="en-US" smtClean="0">
@@ -3935,8 +3955,12 @@
                 <a:latin typeface="Arial" pitchFamily="34" charset="0"/>
                 <a:cs typeface="Arial" pitchFamily="34" charset="0"/>
               </a:rPr>
-              <a:t>Khóa</a:t>
-            </a:r>
+              <a:t>Khóa học</a:t>
+            </a:r>
+            <a:endParaRPr lang="en-US" smtClean="0">
+              <a:latin typeface="Arial" pitchFamily="34" charset="0"/>
+              <a:cs typeface="Arial" pitchFamily="34" charset="0"/>
+            </a:endParaRPr>
           </a:p>
           <a:p>
             <a:pPr lvl="1"/>
@@ -4001,6 +4025,13 @@
   <p:clrMapOvr>
     <a:masterClrMapping/>
   </p:clrMapOvr>
+  <p:timing>
+    <p:tnLst>
+      <p:par>
+        <p:cTn id="1" dur="indefinite" restart="never" nodeType="tmRoot"/>
+      </p:par>
+    </p:tnLst>
+  </p:timing>
 </p:sld>
 </file>
 
@@ -4087,29 +4118,33 @@
                 <a:latin typeface="Arial" pitchFamily="34" charset="0"/>
                 <a:cs typeface="Arial" pitchFamily="34" charset="0"/>
               </a:rPr>
-              <a:t>Đối tượng nghiên cứu của đề tài chủ yếu tập trung vào </a:t>
+              <a:t>Đối tượng nghiên cứu của đề tài chủ yếu tập trung vào thống </a:t>
+            </a:r>
+            <a:r>
+              <a:rPr lang="en-US" smtClean="0">
+                <a:latin typeface="Arial" pitchFamily="34" charset="0"/>
+                <a:cs typeface="Arial" pitchFamily="34" charset="0"/>
+              </a:rPr>
+              <a:t>kê </a:t>
             </a:r>
             <a:r>
               <a:rPr lang="en-US">
                 <a:latin typeface="Arial" pitchFamily="34" charset="0"/>
                 <a:cs typeface="Arial" pitchFamily="34" charset="0"/>
               </a:rPr>
-              <a:t>thống </a:t>
+              <a:t>ban cán sự theo khóa, theo bộ môn, theo </a:t>
             </a:r>
             <a:r>
               <a:rPr lang="en-US" smtClean="0">
                 <a:latin typeface="Arial" pitchFamily="34" charset="0"/>
                 <a:cs typeface="Arial" pitchFamily="34" charset="0"/>
               </a:rPr>
-              <a:t>kê </a:t>
-            </a:r>
-            <a:r>
-              <a:rPr lang="en-US">
-                <a:latin typeface="Arial" pitchFamily="34" charset="0"/>
-                <a:cs typeface="Arial" pitchFamily="34" charset="0"/>
-              </a:rPr>
-              <a:t>ban cán sự theo khóa, theo bộ môn, theo lớp.</a:t>
-            </a:r>
+              <a:t>lớp, theo CVHT.</a:t>
+            </a:r>
+            <a:endParaRPr lang="en-US">
+              <a:latin typeface="Arial" pitchFamily="34" charset="0"/>
+              <a:cs typeface="Arial" pitchFamily="34" charset="0"/>
+            </a:endParaRPr>
           </a:p>
           <a:p>
             <a:r>
@@ -4165,6 +4200,13 @@
   <p:clrMapOvr>
     <a:masterClrMapping/>
   </p:clrMapOvr>
+  <p:timing>
+    <p:tnLst>
+      <p:par>
+        <p:cTn id="1" dur="indefinite" restart="never" nodeType="tmRoot"/>
+      </p:par>
+    </p:tnLst>
+  </p:timing>
 </p:sld>
 </file>
 
@@ -4255,14 +4297,7 @@
                 <a:latin typeface="Arial" pitchFamily="34" charset="0"/>
                 <a:cs typeface="Arial" pitchFamily="34" charset="0"/>
               </a:rPr>
-              <a:t>Nghiên cứu </a:t>
-            </a:r>
-            <a:r>
-              <a:rPr lang="en-US" b="1">
-                <a:latin typeface="Arial" pitchFamily="34" charset="0"/>
-                <a:cs typeface="Arial" pitchFamily="34" charset="0"/>
-              </a:rPr>
-              <a:t>lý </a:t>
+              <a:t>Nghiên cứu lý </a:t>
             </a:r>
             <a:r>
               <a:rPr lang="en-US" b="1" smtClean="0">
@@ -4364,6 +4399,13 @@
   <p:clrMapOvr>
     <a:masterClrMapping/>
   </p:clrMapOvr>
+  <p:timing>
+    <p:tnLst>
+      <p:par>
+        <p:cTn id="1" dur="indefinite" restart="never" nodeType="tmRoot"/>
+      </p:par>
+    </p:tnLst>
+  </p:timing>
 </p:sld>
 </file>
 
@@ -4432,6 +4474,13 @@
   <p:clrMapOvr>
     <a:masterClrMapping/>
   </p:clrMapOvr>
+  <p:timing>
+    <p:tnLst>
+      <p:par>
+        <p:cTn id="1" dur="indefinite" restart="never" nodeType="tmRoot"/>
+      </p:par>
+    </p:tnLst>
+  </p:timing>
 </p:sld>
 </file>
 

</xml_diff>

<commit_message>
Sua bai bao cao, ppt
</commit_message>
<xml_diff>
--- a/bao cao/Slide Bao Cao.pptx
+++ b/bao cao/Slide Bao Cao.pptx
@@ -12,6 +12,8 @@
     <p:sldId id="260" r:id="rId6"/>
     <p:sldId id="261" r:id="rId7"/>
     <p:sldId id="262" r:id="rId8"/>
+    <p:sldId id="263" r:id="rId9"/>
+    <p:sldId id="264" r:id="rId10"/>
   </p:sldIdLst>
   <p:sldSz cx="9144000" cy="6858000" type="screen4x3"/>
   <p:notesSz cx="6858000" cy="9144000"/>
@@ -310,7 +312,7 @@
           <a:p>
             <a:fld id="{0161BABB-F365-4A74-9F23-FCA7B84113A8}" type="datetimeFigureOut">
               <a:rPr lang="en-US" smtClean="0"/>
-              <a:t>11/12/2019</a:t>
+              <a:t>12/19/2019</a:t>
             </a:fld>
             <a:endParaRPr lang="en-US"/>
           </a:p>
@@ -480,7 +482,7 @@
           <a:p>
             <a:fld id="{0161BABB-F365-4A74-9F23-FCA7B84113A8}" type="datetimeFigureOut">
               <a:rPr lang="en-US" smtClean="0"/>
-              <a:t>11/12/2019</a:t>
+              <a:t>12/19/2019</a:t>
             </a:fld>
             <a:endParaRPr lang="en-US"/>
           </a:p>
@@ -660,7 +662,7 @@
           <a:p>
             <a:fld id="{0161BABB-F365-4A74-9F23-FCA7B84113A8}" type="datetimeFigureOut">
               <a:rPr lang="en-US" smtClean="0"/>
-              <a:t>11/12/2019</a:t>
+              <a:t>12/19/2019</a:t>
             </a:fld>
             <a:endParaRPr lang="en-US"/>
           </a:p>
@@ -830,7 +832,7 @@
           <a:p>
             <a:fld id="{0161BABB-F365-4A74-9F23-FCA7B84113A8}" type="datetimeFigureOut">
               <a:rPr lang="en-US" smtClean="0"/>
-              <a:t>11/12/2019</a:t>
+              <a:t>12/19/2019</a:t>
             </a:fld>
             <a:endParaRPr lang="en-US"/>
           </a:p>
@@ -1076,7 +1078,7 @@
           <a:p>
             <a:fld id="{0161BABB-F365-4A74-9F23-FCA7B84113A8}" type="datetimeFigureOut">
               <a:rPr lang="en-US" smtClean="0"/>
-              <a:t>11/12/2019</a:t>
+              <a:t>12/19/2019</a:t>
             </a:fld>
             <a:endParaRPr lang="en-US"/>
           </a:p>
@@ -1364,7 +1366,7 @@
           <a:p>
             <a:fld id="{0161BABB-F365-4A74-9F23-FCA7B84113A8}" type="datetimeFigureOut">
               <a:rPr lang="en-US" smtClean="0"/>
-              <a:t>11/12/2019</a:t>
+              <a:t>12/19/2019</a:t>
             </a:fld>
             <a:endParaRPr lang="en-US"/>
           </a:p>
@@ -1786,7 +1788,7 @@
           <a:p>
             <a:fld id="{0161BABB-F365-4A74-9F23-FCA7B84113A8}" type="datetimeFigureOut">
               <a:rPr lang="en-US" smtClean="0"/>
-              <a:t>11/12/2019</a:t>
+              <a:t>12/19/2019</a:t>
             </a:fld>
             <a:endParaRPr lang="en-US"/>
           </a:p>
@@ -1904,7 +1906,7 @@
           <a:p>
             <a:fld id="{0161BABB-F365-4A74-9F23-FCA7B84113A8}" type="datetimeFigureOut">
               <a:rPr lang="en-US" smtClean="0"/>
-              <a:t>11/12/2019</a:t>
+              <a:t>12/19/2019</a:t>
             </a:fld>
             <a:endParaRPr lang="en-US"/>
           </a:p>
@@ -1999,7 +2001,7 @@
           <a:p>
             <a:fld id="{0161BABB-F365-4A74-9F23-FCA7B84113A8}" type="datetimeFigureOut">
               <a:rPr lang="en-US" smtClean="0"/>
-              <a:t>11/12/2019</a:t>
+              <a:t>12/19/2019</a:t>
             </a:fld>
             <a:endParaRPr lang="en-US"/>
           </a:p>
@@ -2276,7 +2278,7 @@
           <a:p>
             <a:fld id="{0161BABB-F365-4A74-9F23-FCA7B84113A8}" type="datetimeFigureOut">
               <a:rPr lang="en-US" smtClean="0"/>
-              <a:t>11/12/2019</a:t>
+              <a:t>12/19/2019</a:t>
             </a:fld>
             <a:endParaRPr lang="en-US"/>
           </a:p>
@@ -2529,7 +2531,7 @@
           <a:p>
             <a:fld id="{0161BABB-F365-4A74-9F23-FCA7B84113A8}" type="datetimeFigureOut">
               <a:rPr lang="en-US" smtClean="0"/>
-              <a:t>11/12/2019</a:t>
+              <a:t>12/19/2019</a:t>
             </a:fld>
             <a:endParaRPr lang="en-US"/>
           </a:p>
@@ -2597,6 +2599,7 @@
       <p:bgPr>
         <a:blipFill dpi="0" rotWithShape="1">
           <a:blip r:embed="rId13">
+            <a:alphaModFix amt="62000"/>
             <a:lum/>
           </a:blip>
           <a:srcRect/>
@@ -2751,7 +2754,7 @@
           <a:p>
             <a:fld id="{0161BABB-F365-4A74-9F23-FCA7B84113A8}" type="datetimeFigureOut">
               <a:rPr lang="en-US" smtClean="0"/>
-              <a:t>11/12/2019</a:t>
+              <a:t>12/19/2019</a:t>
             </a:fld>
             <a:endParaRPr lang="en-US"/>
           </a:p>
@@ -3138,7 +3141,7 @@
         </p:nvSpPr>
         <p:spPr>
           <a:xfrm>
-            <a:off x="484909" y="4800599"/>
+            <a:off x="484909" y="4800600"/>
             <a:ext cx="3532909" cy="1607127"/>
           </a:xfrm>
         </p:spPr>
@@ -3189,7 +3192,7 @@
               <a:buNone/>
             </a:pPr>
             <a:r>
-              <a:rPr lang="en-US" sz="3600" b="1" smtClean="0">
+              <a:rPr lang="en-US" sz="3600" b="1" dirty="0" smtClean="0">
                 <a:solidFill>
                   <a:srgbClr val="FF0000"/>
                 </a:solidFill>
@@ -3199,7 +3202,7 @@
               <a:t>ĐỀ TÀI</a:t>
             </a:r>
             <a:r>
-              <a:rPr lang="en-US" sz="2800" b="1" smtClean="0">
+              <a:rPr lang="en-US" sz="2800" b="1" dirty="0" smtClean="0">
                 <a:solidFill>
                   <a:srgbClr val="FF0000"/>
                 </a:solidFill>
@@ -3209,7 +3212,7 @@
               <a:t/>
             </a:r>
             <a:br>
-              <a:rPr lang="en-US" sz="2800" b="1" smtClean="0">
+              <a:rPr lang="en-US" sz="2800" b="1" dirty="0" smtClean="0">
                 <a:solidFill>
                   <a:srgbClr val="FF0000"/>
                 </a:solidFill>
@@ -3218,7 +3221,7 @@
               </a:rPr>
             </a:br>
             <a:r>
-              <a:rPr lang="en-US" sz="2800" b="1" smtClean="0">
+              <a:rPr lang="en-US" sz="2800" b="1" dirty="0" smtClean="0">
                 <a:solidFill>
                   <a:srgbClr val="FF0000"/>
                 </a:solidFill>
@@ -3233,7 +3236,7 @@
               <a:buNone/>
             </a:pPr>
             <a:r>
-              <a:rPr lang="en-US" sz="2800" b="1" smtClean="0">
+              <a:rPr lang="en-US" sz="2800" b="1" dirty="0" smtClean="0">
                 <a:solidFill>
                   <a:srgbClr val="FF0000"/>
                 </a:solidFill>
@@ -3242,7 +3245,7 @@
               </a:rPr>
               <a:t> KHOA KỸ THUẬT VÀ CÔNG NGHỆ</a:t>
             </a:r>
-            <a:endParaRPr lang="en-US" sz="2800" b="1">
+            <a:endParaRPr lang="en-US" sz="2800" b="1" dirty="0">
               <a:solidFill>
                 <a:srgbClr val="FF0000"/>
               </a:solidFill>
@@ -3321,39 +3324,46 @@
           </a:lstStyle>
           <a:p>
             <a:r>
-              <a:rPr lang="en-US" sz="1800" b="1" smtClean="0">
+              <a:rPr lang="en-US" sz="1800" dirty="0" smtClean="0">
                 <a:latin typeface="Arial" pitchFamily="34" charset="0"/>
                 <a:cs typeface="Arial" pitchFamily="34" charset="0"/>
               </a:rPr>
               <a:t>TRƯỜNG ĐẠI HỌC TRÀ VINH</a:t>
             </a:r>
-            <a:br>
-              <a:rPr lang="en-US" sz="1800" b="1" smtClean="0">
+            <a:r>
+              <a:rPr lang="en-US" sz="1800" b="1" dirty="0" smtClean="0">
                 <a:latin typeface="Arial" pitchFamily="34" charset="0"/>
                 <a:cs typeface="Arial" pitchFamily="34" charset="0"/>
               </a:rPr>
-            </a:br>
-            <a:r>
-              <a:rPr lang="en-US" sz="1800" b="1" smtClean="0">
+              <a:t/>
+            </a:r>
+            <a:br>
+              <a:rPr lang="en-US" sz="1800" b="1" dirty="0" smtClean="0">
                 <a:latin typeface="Arial" pitchFamily="34" charset="0"/>
                 <a:cs typeface="Arial" pitchFamily="34" charset="0"/>
               </a:rPr>
-              <a:t>KHOA KỸ THUẬT VÀ CÔNG NGHỆ</a:t>
-            </a:r>
-            <a:br>
-              <a:rPr lang="en-US" sz="1800" b="1" smtClean="0">
+            </a:br>
+            <a:r>
+              <a:rPr lang="en-US" sz="1800" b="1" dirty="0" smtClean="0">
                 <a:latin typeface="Arial" pitchFamily="34" charset="0"/>
                 <a:cs typeface="Arial" pitchFamily="34" charset="0"/>
               </a:rPr>
-            </a:br>
-            <a:r>
-              <a:rPr lang="en-US" sz="1800" b="1" smtClean="0">
+              <a:t>KHOA KỸ THUẬT VÀ CÔNG NGHỆ</a:t>
+            </a:r>
+            <a:br>
+              <a:rPr lang="en-US" sz="1800" b="1" dirty="0" smtClean="0">
                 <a:latin typeface="Arial" pitchFamily="34" charset="0"/>
                 <a:cs typeface="Arial" pitchFamily="34" charset="0"/>
               </a:rPr>
+            </a:br>
+            <a:r>
+              <a:rPr lang="en-US" sz="1800" b="1" dirty="0" smtClean="0">
+                <a:latin typeface="Arial" pitchFamily="34" charset="0"/>
+                <a:cs typeface="Arial" pitchFamily="34" charset="0"/>
+              </a:rPr>
               <a:t>BỘ MÔN CÔNG NGHỆ THÔNG TIN</a:t>
             </a:r>
-            <a:endParaRPr lang="en-US" sz="1800" b="1">
+            <a:endParaRPr lang="en-US" sz="1800" b="1" dirty="0">
               <a:latin typeface="Arial" pitchFamily="34" charset="0"/>
               <a:cs typeface="Arial" pitchFamily="34" charset="0"/>
             </a:endParaRPr>
@@ -3532,7 +3542,7 @@
               <a:buAutoNum type="romanUcPeriod"/>
             </a:pPr>
             <a:r>
-              <a:rPr lang="en-US" smtClean="0">
+              <a:rPr lang="en-US" dirty="0" smtClean="0">
                 <a:latin typeface="Arial" pitchFamily="34" charset="0"/>
                 <a:cs typeface="Arial" pitchFamily="34" charset="0"/>
               </a:rPr>
@@ -3545,12 +3555,23 @@
               <a:buAutoNum type="romanUcPeriod"/>
             </a:pPr>
             <a:r>
-              <a:rPr lang="en-US" smtClean="0">
+              <a:rPr lang="en-US" dirty="0" smtClean="0">
                 <a:latin typeface="Arial" pitchFamily="34" charset="0"/>
                 <a:cs typeface="Arial" pitchFamily="34" charset="0"/>
               </a:rPr>
-              <a:t>Nội dung, phương pháp, đối tượng nghiên cứu.</a:t>
-            </a:r>
+              <a:t>Nội dung, phương pháp, đối tượng nghiên cứu</a:t>
+            </a:r>
+            <a:r>
+              <a:rPr lang="en-US" dirty="0" smtClean="0">
+                <a:latin typeface="Arial" pitchFamily="34" charset="0"/>
+                <a:cs typeface="Arial" pitchFamily="34" charset="0"/>
+              </a:rPr>
+              <a:t>.</a:t>
+            </a:r>
+            <a:endParaRPr lang="en-US" dirty="0" smtClean="0">
+              <a:latin typeface="Arial" pitchFamily="34" charset="0"/>
+              <a:cs typeface="Arial" pitchFamily="34" charset="0"/>
+            </a:endParaRPr>
           </a:p>
           <a:p>
             <a:pPr marL="571500" indent="-571500">
@@ -3558,7 +3579,7 @@
               <a:buAutoNum type="romanUcPeriod"/>
             </a:pPr>
             <a:r>
-              <a:rPr lang="en-US" smtClean="0">
+              <a:rPr lang="en-US" dirty="0" smtClean="0">
                 <a:latin typeface="Arial" pitchFamily="34" charset="0"/>
                 <a:cs typeface="Arial" pitchFamily="34" charset="0"/>
               </a:rPr>
@@ -3580,7 +3601,375 @@
   <p:timing>
     <p:tnLst>
       <p:par>
-        <p:cTn id="1" dur="indefinite" restart="never" nodeType="tmRoot"/>
+        <p:cTn id="1" dur="indefinite" restart="never" nodeType="tmRoot">
+          <p:childTnLst>
+            <p:seq concurrent="1" nextAc="seek">
+              <p:cTn id="2" dur="indefinite" nodeType="mainSeq">
+                <p:childTnLst>
+                  <p:par>
+                    <p:cTn id="3" fill="hold">
+                      <p:stCondLst>
+                        <p:cond delay="indefinite"/>
+                      </p:stCondLst>
+                      <p:childTnLst>
+                        <p:par>
+                          <p:cTn id="4" fill="hold">
+                            <p:stCondLst>
+                              <p:cond delay="0"/>
+                            </p:stCondLst>
+                            <p:childTnLst>
+                              <p:par>
+                                <p:cTn id="5" presetID="42" presetClass="entr" presetSubtype="0" fill="hold" nodeType="clickEffect">
+                                  <p:stCondLst>
+                                    <p:cond delay="0"/>
+                                  </p:stCondLst>
+                                  <p:childTnLst>
+                                    <p:set>
+                                      <p:cBhvr>
+                                        <p:cTn id="6" dur="1" fill="hold">
+                                          <p:stCondLst>
+                                            <p:cond delay="0"/>
+                                          </p:stCondLst>
+                                        </p:cTn>
+                                        <p:tgtEl>
+                                          <p:spTgt spid="5">
+                                            <p:txEl>
+                                              <p:pRg st="0" end="0"/>
+                                            </p:txEl>
+                                          </p:spTgt>
+                                        </p:tgtEl>
+                                        <p:attrNameLst>
+                                          <p:attrName>style.visibility</p:attrName>
+                                        </p:attrNameLst>
+                                      </p:cBhvr>
+                                      <p:to>
+                                        <p:strVal val="visible"/>
+                                      </p:to>
+                                    </p:set>
+                                    <p:animEffect transition="in" filter="fade">
+                                      <p:cBhvr>
+                                        <p:cTn id="7" dur="1000"/>
+                                        <p:tgtEl>
+                                          <p:spTgt spid="5">
+                                            <p:txEl>
+                                              <p:pRg st="0" end="0"/>
+                                            </p:txEl>
+                                          </p:spTgt>
+                                        </p:tgtEl>
+                                      </p:cBhvr>
+                                    </p:animEffect>
+                                    <p:anim calcmode="lin" valueType="num">
+                                      <p:cBhvr>
+                                        <p:cTn id="8" dur="1000" fill="hold"/>
+                                        <p:tgtEl>
+                                          <p:spTgt spid="5">
+                                            <p:txEl>
+                                              <p:pRg st="0" end="0"/>
+                                            </p:txEl>
+                                          </p:spTgt>
+                                        </p:tgtEl>
+                                        <p:attrNameLst>
+                                          <p:attrName>ppt_x</p:attrName>
+                                        </p:attrNameLst>
+                                      </p:cBhvr>
+                                      <p:tavLst>
+                                        <p:tav tm="0">
+                                          <p:val>
+                                            <p:strVal val="#ppt_x"/>
+                                          </p:val>
+                                        </p:tav>
+                                        <p:tav tm="100000">
+                                          <p:val>
+                                            <p:strVal val="#ppt_x"/>
+                                          </p:val>
+                                        </p:tav>
+                                      </p:tavLst>
+                                    </p:anim>
+                                    <p:anim calcmode="lin" valueType="num">
+                                      <p:cBhvr>
+                                        <p:cTn id="9" dur="1000" fill="hold"/>
+                                        <p:tgtEl>
+                                          <p:spTgt spid="5">
+                                            <p:txEl>
+                                              <p:pRg st="0" end="0"/>
+                                            </p:txEl>
+                                          </p:spTgt>
+                                        </p:tgtEl>
+                                        <p:attrNameLst>
+                                          <p:attrName>ppt_y</p:attrName>
+                                        </p:attrNameLst>
+                                      </p:cBhvr>
+                                      <p:tavLst>
+                                        <p:tav tm="0">
+                                          <p:val>
+                                            <p:strVal val="#ppt_y+.1"/>
+                                          </p:val>
+                                        </p:tav>
+                                        <p:tav tm="100000">
+                                          <p:val>
+                                            <p:strVal val="#ppt_y"/>
+                                          </p:val>
+                                        </p:tav>
+                                      </p:tavLst>
+                                    </p:anim>
+                                  </p:childTnLst>
+                                </p:cTn>
+                              </p:par>
+                            </p:childTnLst>
+                          </p:cTn>
+                        </p:par>
+                      </p:childTnLst>
+                    </p:cTn>
+                  </p:par>
+                  <p:par>
+                    <p:cTn id="10" fill="hold">
+                      <p:stCondLst>
+                        <p:cond delay="indefinite"/>
+                      </p:stCondLst>
+                      <p:childTnLst>
+                        <p:par>
+                          <p:cTn id="11" fill="hold">
+                            <p:stCondLst>
+                              <p:cond delay="0"/>
+                            </p:stCondLst>
+                            <p:childTnLst>
+                              <p:par>
+                                <p:cTn id="12" presetID="42" presetClass="entr" presetSubtype="0" fill="hold" nodeType="clickEffect">
+                                  <p:stCondLst>
+                                    <p:cond delay="0"/>
+                                  </p:stCondLst>
+                                  <p:childTnLst>
+                                    <p:set>
+                                      <p:cBhvr>
+                                        <p:cTn id="13" dur="1" fill="hold">
+                                          <p:stCondLst>
+                                            <p:cond delay="0"/>
+                                          </p:stCondLst>
+                                        </p:cTn>
+                                        <p:tgtEl>
+                                          <p:spTgt spid="5">
+                                            <p:txEl>
+                                              <p:pRg st="1" end="1"/>
+                                            </p:txEl>
+                                          </p:spTgt>
+                                        </p:tgtEl>
+                                        <p:attrNameLst>
+                                          <p:attrName>style.visibility</p:attrName>
+                                        </p:attrNameLst>
+                                      </p:cBhvr>
+                                      <p:to>
+                                        <p:strVal val="visible"/>
+                                      </p:to>
+                                    </p:set>
+                                    <p:animEffect transition="in" filter="fade">
+                                      <p:cBhvr>
+                                        <p:cTn id="14" dur="1000"/>
+                                        <p:tgtEl>
+                                          <p:spTgt spid="5">
+                                            <p:txEl>
+                                              <p:pRg st="1" end="1"/>
+                                            </p:txEl>
+                                          </p:spTgt>
+                                        </p:tgtEl>
+                                      </p:cBhvr>
+                                    </p:animEffect>
+                                    <p:anim calcmode="lin" valueType="num">
+                                      <p:cBhvr>
+                                        <p:cTn id="15" dur="1000" fill="hold"/>
+                                        <p:tgtEl>
+                                          <p:spTgt spid="5">
+                                            <p:txEl>
+                                              <p:pRg st="1" end="1"/>
+                                            </p:txEl>
+                                          </p:spTgt>
+                                        </p:tgtEl>
+                                        <p:attrNameLst>
+                                          <p:attrName>ppt_x</p:attrName>
+                                        </p:attrNameLst>
+                                      </p:cBhvr>
+                                      <p:tavLst>
+                                        <p:tav tm="0">
+                                          <p:val>
+                                            <p:strVal val="#ppt_x"/>
+                                          </p:val>
+                                        </p:tav>
+                                        <p:tav tm="100000">
+                                          <p:val>
+                                            <p:strVal val="#ppt_x"/>
+                                          </p:val>
+                                        </p:tav>
+                                      </p:tavLst>
+                                    </p:anim>
+                                    <p:anim calcmode="lin" valueType="num">
+                                      <p:cBhvr>
+                                        <p:cTn id="16" dur="1000" fill="hold"/>
+                                        <p:tgtEl>
+                                          <p:spTgt spid="5">
+                                            <p:txEl>
+                                              <p:pRg st="1" end="1"/>
+                                            </p:txEl>
+                                          </p:spTgt>
+                                        </p:tgtEl>
+                                        <p:attrNameLst>
+                                          <p:attrName>ppt_y</p:attrName>
+                                        </p:attrNameLst>
+                                      </p:cBhvr>
+                                      <p:tavLst>
+                                        <p:tav tm="0">
+                                          <p:val>
+                                            <p:strVal val="#ppt_y+.1"/>
+                                          </p:val>
+                                        </p:tav>
+                                        <p:tav tm="100000">
+                                          <p:val>
+                                            <p:strVal val="#ppt_y"/>
+                                          </p:val>
+                                        </p:tav>
+                                      </p:tavLst>
+                                    </p:anim>
+                                  </p:childTnLst>
+                                </p:cTn>
+                              </p:par>
+                            </p:childTnLst>
+                          </p:cTn>
+                        </p:par>
+                      </p:childTnLst>
+                    </p:cTn>
+                  </p:par>
+                  <p:par>
+                    <p:cTn id="17" fill="hold">
+                      <p:stCondLst>
+                        <p:cond delay="indefinite"/>
+                      </p:stCondLst>
+                      <p:childTnLst>
+                        <p:par>
+                          <p:cTn id="18" fill="hold">
+                            <p:stCondLst>
+                              <p:cond delay="0"/>
+                            </p:stCondLst>
+                            <p:childTnLst>
+                              <p:par>
+                                <p:cTn id="19" presetID="42" presetClass="entr" presetSubtype="0" fill="hold" nodeType="clickEffect">
+                                  <p:stCondLst>
+                                    <p:cond delay="0"/>
+                                  </p:stCondLst>
+                                  <p:childTnLst>
+                                    <p:set>
+                                      <p:cBhvr>
+                                        <p:cTn id="20" dur="1" fill="hold">
+                                          <p:stCondLst>
+                                            <p:cond delay="0"/>
+                                          </p:stCondLst>
+                                        </p:cTn>
+                                        <p:tgtEl>
+                                          <p:spTgt spid="5">
+                                            <p:txEl>
+                                              <p:pRg st="2" end="2"/>
+                                            </p:txEl>
+                                          </p:spTgt>
+                                        </p:tgtEl>
+                                        <p:attrNameLst>
+                                          <p:attrName>style.visibility</p:attrName>
+                                        </p:attrNameLst>
+                                      </p:cBhvr>
+                                      <p:to>
+                                        <p:strVal val="visible"/>
+                                      </p:to>
+                                    </p:set>
+                                    <p:animEffect transition="in" filter="fade">
+                                      <p:cBhvr>
+                                        <p:cTn id="21" dur="1000"/>
+                                        <p:tgtEl>
+                                          <p:spTgt spid="5">
+                                            <p:txEl>
+                                              <p:pRg st="2" end="2"/>
+                                            </p:txEl>
+                                          </p:spTgt>
+                                        </p:tgtEl>
+                                      </p:cBhvr>
+                                    </p:animEffect>
+                                    <p:anim calcmode="lin" valueType="num">
+                                      <p:cBhvr>
+                                        <p:cTn id="22" dur="1000" fill="hold"/>
+                                        <p:tgtEl>
+                                          <p:spTgt spid="5">
+                                            <p:txEl>
+                                              <p:pRg st="2" end="2"/>
+                                            </p:txEl>
+                                          </p:spTgt>
+                                        </p:tgtEl>
+                                        <p:attrNameLst>
+                                          <p:attrName>ppt_x</p:attrName>
+                                        </p:attrNameLst>
+                                      </p:cBhvr>
+                                      <p:tavLst>
+                                        <p:tav tm="0">
+                                          <p:val>
+                                            <p:strVal val="#ppt_x"/>
+                                          </p:val>
+                                        </p:tav>
+                                        <p:tav tm="100000">
+                                          <p:val>
+                                            <p:strVal val="#ppt_x"/>
+                                          </p:val>
+                                        </p:tav>
+                                      </p:tavLst>
+                                    </p:anim>
+                                    <p:anim calcmode="lin" valueType="num">
+                                      <p:cBhvr>
+                                        <p:cTn id="23" dur="1000" fill="hold"/>
+                                        <p:tgtEl>
+                                          <p:spTgt spid="5">
+                                            <p:txEl>
+                                              <p:pRg st="2" end="2"/>
+                                            </p:txEl>
+                                          </p:spTgt>
+                                        </p:tgtEl>
+                                        <p:attrNameLst>
+                                          <p:attrName>ppt_y</p:attrName>
+                                        </p:attrNameLst>
+                                      </p:cBhvr>
+                                      <p:tavLst>
+                                        <p:tav tm="0">
+                                          <p:val>
+                                            <p:strVal val="#ppt_y+.1"/>
+                                          </p:val>
+                                        </p:tav>
+                                        <p:tav tm="100000">
+                                          <p:val>
+                                            <p:strVal val="#ppt_y"/>
+                                          </p:val>
+                                        </p:tav>
+                                      </p:tavLst>
+                                    </p:anim>
+                                  </p:childTnLst>
+                                </p:cTn>
+                              </p:par>
+                            </p:childTnLst>
+                          </p:cTn>
+                        </p:par>
+                      </p:childTnLst>
+                    </p:cTn>
+                  </p:par>
+                </p:childTnLst>
+              </p:cTn>
+              <p:prevCondLst>
+                <p:cond evt="onPrev" delay="0">
+                  <p:tgtEl>
+                    <p:sldTgt/>
+                  </p:tgtEl>
+                </p:cond>
+              </p:prevCondLst>
+              <p:nextCondLst>
+                <p:cond evt="onNext" delay="0">
+                  <p:tgtEl>
+                    <p:sldTgt/>
+                  </p:tgtEl>
+                </p:cond>
+              </p:nextCondLst>
+            </p:seq>
+          </p:childTnLst>
+        </p:cTn>
       </p:par>
     </p:tnLst>
   </p:timing>
@@ -3670,7 +4059,7 @@
           <a:lstStyle/>
           <a:p>
             <a:r>
-              <a:rPr lang="en-US" smtClean="0">
+              <a:rPr lang="en-US" dirty="0" smtClean="0">
                 <a:latin typeface="Arial" pitchFamily="34" charset="0"/>
                 <a:cs typeface="Arial" pitchFamily="34" charset="0"/>
               </a:rPr>
@@ -3681,7 +4070,7 @@
             <a:pPr marL="457200" lvl="1" indent="0">
               <a:buNone/>
             </a:pPr>
-            <a:endParaRPr lang="en-US" smtClean="0">
+            <a:endParaRPr lang="en-US" dirty="0" smtClean="0">
               <a:latin typeface="Arial" pitchFamily="34" charset="0"/>
               <a:cs typeface="Arial" pitchFamily="34" charset="0"/>
             </a:endParaRPr>
@@ -3820,9 +4209,362 @@
   <p:timing>
     <p:tnLst>
       <p:par>
-        <p:cTn id="1" dur="indefinite" restart="never" nodeType="tmRoot"/>
+        <p:cTn id="1" dur="indefinite" restart="never" nodeType="tmRoot">
+          <p:childTnLst>
+            <p:seq concurrent="1" nextAc="seek">
+              <p:cTn id="2" dur="indefinite" nodeType="mainSeq">
+                <p:childTnLst>
+                  <p:par>
+                    <p:cTn id="3" fill="hold">
+                      <p:stCondLst>
+                        <p:cond delay="indefinite"/>
+                      </p:stCondLst>
+                      <p:childTnLst>
+                        <p:par>
+                          <p:cTn id="4" fill="hold">
+                            <p:stCondLst>
+                              <p:cond delay="0"/>
+                            </p:stCondLst>
+                            <p:childTnLst>
+                              <p:par>
+                                <p:cTn id="5" presetID="42" presetClass="entr" presetSubtype="0" fill="hold" grpId="0" nodeType="clickEffect">
+                                  <p:stCondLst>
+                                    <p:cond delay="0"/>
+                                  </p:stCondLst>
+                                  <p:childTnLst>
+                                    <p:set>
+                                      <p:cBhvr>
+                                        <p:cTn id="6" dur="1" fill="hold">
+                                          <p:stCondLst>
+                                            <p:cond delay="0"/>
+                                          </p:stCondLst>
+                                        </p:cTn>
+                                        <p:tgtEl>
+                                          <p:spTgt spid="3">
+                                            <p:txEl>
+                                              <p:pRg st="0" end="0"/>
+                                            </p:txEl>
+                                          </p:spTgt>
+                                        </p:tgtEl>
+                                        <p:attrNameLst>
+                                          <p:attrName>style.visibility</p:attrName>
+                                        </p:attrNameLst>
+                                      </p:cBhvr>
+                                      <p:to>
+                                        <p:strVal val="visible"/>
+                                      </p:to>
+                                    </p:set>
+                                    <p:animEffect transition="in" filter="fade">
+                                      <p:cBhvr>
+                                        <p:cTn id="7" dur="1000"/>
+                                        <p:tgtEl>
+                                          <p:spTgt spid="3">
+                                            <p:txEl>
+                                              <p:pRg st="0" end="0"/>
+                                            </p:txEl>
+                                          </p:spTgt>
+                                        </p:tgtEl>
+                                      </p:cBhvr>
+                                    </p:animEffect>
+                                    <p:anim calcmode="lin" valueType="num">
+                                      <p:cBhvr>
+                                        <p:cTn id="8" dur="1000" fill="hold"/>
+                                        <p:tgtEl>
+                                          <p:spTgt spid="3">
+                                            <p:txEl>
+                                              <p:pRg st="0" end="0"/>
+                                            </p:txEl>
+                                          </p:spTgt>
+                                        </p:tgtEl>
+                                        <p:attrNameLst>
+                                          <p:attrName>ppt_x</p:attrName>
+                                        </p:attrNameLst>
+                                      </p:cBhvr>
+                                      <p:tavLst>
+                                        <p:tav tm="0">
+                                          <p:val>
+                                            <p:strVal val="#ppt_x"/>
+                                          </p:val>
+                                        </p:tav>
+                                        <p:tav tm="100000">
+                                          <p:val>
+                                            <p:strVal val="#ppt_x"/>
+                                          </p:val>
+                                        </p:tav>
+                                      </p:tavLst>
+                                    </p:anim>
+                                    <p:anim calcmode="lin" valueType="num">
+                                      <p:cBhvr>
+                                        <p:cTn id="9" dur="1000" fill="hold"/>
+                                        <p:tgtEl>
+                                          <p:spTgt spid="3">
+                                            <p:txEl>
+                                              <p:pRg st="0" end="0"/>
+                                            </p:txEl>
+                                          </p:spTgt>
+                                        </p:tgtEl>
+                                        <p:attrNameLst>
+                                          <p:attrName>ppt_y</p:attrName>
+                                        </p:attrNameLst>
+                                      </p:cBhvr>
+                                      <p:tavLst>
+                                        <p:tav tm="0">
+                                          <p:val>
+                                            <p:strVal val="#ppt_y+.1"/>
+                                          </p:val>
+                                        </p:tav>
+                                        <p:tav tm="100000">
+                                          <p:val>
+                                            <p:strVal val="#ppt_y"/>
+                                          </p:val>
+                                        </p:tav>
+                                      </p:tavLst>
+                                    </p:anim>
+                                  </p:childTnLst>
+                                </p:cTn>
+                              </p:par>
+                            </p:childTnLst>
+                          </p:cTn>
+                        </p:par>
+                      </p:childTnLst>
+                    </p:cTn>
+                  </p:par>
+                  <p:par>
+                    <p:cTn id="10" fill="hold">
+                      <p:stCondLst>
+                        <p:cond delay="indefinite"/>
+                      </p:stCondLst>
+                      <p:childTnLst>
+                        <p:par>
+                          <p:cTn id="11" fill="hold">
+                            <p:stCondLst>
+                              <p:cond delay="0"/>
+                            </p:stCondLst>
+                            <p:childTnLst>
+                              <p:par>
+                                <p:cTn id="12" presetID="16" presetClass="entr" presetSubtype="21" fill="hold" nodeType="clickEffect">
+                                  <p:stCondLst>
+                                    <p:cond delay="0"/>
+                                  </p:stCondLst>
+                                  <p:childTnLst>
+                                    <p:set>
+                                      <p:cBhvr>
+                                        <p:cTn id="13" dur="1" fill="hold">
+                                          <p:stCondLst>
+                                            <p:cond delay="0"/>
+                                          </p:stCondLst>
+                                        </p:cTn>
+                                        <p:tgtEl>
+                                          <p:spTgt spid="5"/>
+                                        </p:tgtEl>
+                                        <p:attrNameLst>
+                                          <p:attrName>style.visibility</p:attrName>
+                                        </p:attrNameLst>
+                                      </p:cBhvr>
+                                      <p:to>
+                                        <p:strVal val="visible"/>
+                                      </p:to>
+                                    </p:set>
+                                    <p:animEffect transition="in" filter="barn(inVertical)">
+                                      <p:cBhvr>
+                                        <p:cTn id="14" dur="500"/>
+                                        <p:tgtEl>
+                                          <p:spTgt spid="5"/>
+                                        </p:tgtEl>
+                                      </p:cBhvr>
+                                    </p:animEffect>
+                                  </p:childTnLst>
+                                </p:cTn>
+                              </p:par>
+                            </p:childTnLst>
+                          </p:cTn>
+                        </p:par>
+                      </p:childTnLst>
+                    </p:cTn>
+                  </p:par>
+                  <p:par>
+                    <p:cTn id="15" fill="hold">
+                      <p:stCondLst>
+                        <p:cond delay="indefinite"/>
+                      </p:stCondLst>
+                      <p:childTnLst>
+                        <p:par>
+                          <p:cTn id="16" fill="hold">
+                            <p:stCondLst>
+                              <p:cond delay="0"/>
+                            </p:stCondLst>
+                            <p:childTnLst>
+                              <p:par>
+                                <p:cTn id="17" presetID="16" presetClass="entr" presetSubtype="21" fill="hold" nodeType="clickEffect">
+                                  <p:stCondLst>
+                                    <p:cond delay="0"/>
+                                  </p:stCondLst>
+                                  <p:childTnLst>
+                                    <p:set>
+                                      <p:cBhvr>
+                                        <p:cTn id="18" dur="1" fill="hold">
+                                          <p:stCondLst>
+                                            <p:cond delay="0"/>
+                                          </p:stCondLst>
+                                        </p:cTn>
+                                        <p:tgtEl>
+                                          <p:spTgt spid="6"/>
+                                        </p:tgtEl>
+                                        <p:attrNameLst>
+                                          <p:attrName>style.visibility</p:attrName>
+                                        </p:attrNameLst>
+                                      </p:cBhvr>
+                                      <p:to>
+                                        <p:strVal val="visible"/>
+                                      </p:to>
+                                    </p:set>
+                                    <p:animEffect transition="in" filter="barn(inVertical)">
+                                      <p:cBhvr>
+                                        <p:cTn id="19" dur="500"/>
+                                        <p:tgtEl>
+                                          <p:spTgt spid="6"/>
+                                        </p:tgtEl>
+                                      </p:cBhvr>
+                                    </p:animEffect>
+                                  </p:childTnLst>
+                                </p:cTn>
+                              </p:par>
+                            </p:childTnLst>
+                          </p:cTn>
+                        </p:par>
+                      </p:childTnLst>
+                    </p:cTn>
+                  </p:par>
+                  <p:par>
+                    <p:cTn id="20" fill="hold">
+                      <p:stCondLst>
+                        <p:cond delay="indefinite"/>
+                      </p:stCondLst>
+                      <p:childTnLst>
+                        <p:par>
+                          <p:cTn id="21" fill="hold">
+                            <p:stCondLst>
+                              <p:cond delay="0"/>
+                            </p:stCondLst>
+                            <p:childTnLst>
+                              <p:par>
+                                <p:cTn id="22" presetID="16" presetClass="entr" presetSubtype="21" fill="hold" nodeType="clickEffect">
+                                  <p:stCondLst>
+                                    <p:cond delay="0"/>
+                                  </p:stCondLst>
+                                  <p:childTnLst>
+                                    <p:set>
+                                      <p:cBhvr>
+                                        <p:cTn id="23" dur="1" fill="hold">
+                                          <p:stCondLst>
+                                            <p:cond delay="0"/>
+                                          </p:stCondLst>
+                                        </p:cTn>
+                                        <p:tgtEl>
+                                          <p:spTgt spid="7"/>
+                                        </p:tgtEl>
+                                        <p:attrNameLst>
+                                          <p:attrName>style.visibility</p:attrName>
+                                        </p:attrNameLst>
+                                      </p:cBhvr>
+                                      <p:to>
+                                        <p:strVal val="visible"/>
+                                      </p:to>
+                                    </p:set>
+                                    <p:animEffect transition="in" filter="barn(inVertical)">
+                                      <p:cBhvr>
+                                        <p:cTn id="24" dur="500"/>
+                                        <p:tgtEl>
+                                          <p:spTgt spid="7"/>
+                                        </p:tgtEl>
+                                      </p:cBhvr>
+                                    </p:animEffect>
+                                  </p:childTnLst>
+                                </p:cTn>
+                              </p:par>
+                            </p:childTnLst>
+                          </p:cTn>
+                        </p:par>
+                      </p:childTnLst>
+                    </p:cTn>
+                  </p:par>
+                  <p:par>
+                    <p:cTn id="25" fill="hold">
+                      <p:stCondLst>
+                        <p:cond delay="indefinite"/>
+                      </p:stCondLst>
+                      <p:childTnLst>
+                        <p:par>
+                          <p:cTn id="26" fill="hold">
+                            <p:stCondLst>
+                              <p:cond delay="0"/>
+                            </p:stCondLst>
+                            <p:childTnLst>
+                              <p:par>
+                                <p:cTn id="27" presetID="16" presetClass="entr" presetSubtype="21" fill="hold" nodeType="clickEffect">
+                                  <p:stCondLst>
+                                    <p:cond delay="0"/>
+                                  </p:stCondLst>
+                                  <p:childTnLst>
+                                    <p:set>
+                                      <p:cBhvr>
+                                        <p:cTn id="28" dur="1" fill="hold">
+                                          <p:stCondLst>
+                                            <p:cond delay="0"/>
+                                          </p:stCondLst>
+                                        </p:cTn>
+                                        <p:tgtEl>
+                                          <p:spTgt spid="8"/>
+                                        </p:tgtEl>
+                                        <p:attrNameLst>
+                                          <p:attrName>style.visibility</p:attrName>
+                                        </p:attrNameLst>
+                                      </p:cBhvr>
+                                      <p:to>
+                                        <p:strVal val="visible"/>
+                                      </p:to>
+                                    </p:set>
+                                    <p:animEffect transition="in" filter="barn(inVertical)">
+                                      <p:cBhvr>
+                                        <p:cTn id="29" dur="500"/>
+                                        <p:tgtEl>
+                                          <p:spTgt spid="8"/>
+                                        </p:tgtEl>
+                                      </p:cBhvr>
+                                    </p:animEffect>
+                                  </p:childTnLst>
+                                </p:cTn>
+                              </p:par>
+                            </p:childTnLst>
+                          </p:cTn>
+                        </p:par>
+                      </p:childTnLst>
+                    </p:cTn>
+                  </p:par>
+                </p:childTnLst>
+              </p:cTn>
+              <p:prevCondLst>
+                <p:cond evt="onPrev" delay="0">
+                  <p:tgtEl>
+                    <p:sldTgt/>
+                  </p:tgtEl>
+                </p:cond>
+              </p:prevCondLst>
+              <p:nextCondLst>
+                <p:cond evt="onNext" delay="0">
+                  <p:tgtEl>
+                    <p:sldTgt/>
+                  </p:tgtEl>
+                </p:cond>
+              </p:nextCondLst>
+            </p:seq>
+          </p:childTnLst>
+        </p:cTn>
       </p:par>
     </p:tnLst>
+    <p:bldLst>
+      <p:bldP spid="3" grpId="0" build="p"/>
+    </p:bldLst>
   </p:timing>
 </p:sld>
 </file>
@@ -3908,110 +4650,106 @@
           </a:bodyPr>
           <a:lstStyle/>
           <a:p>
-            <a:pPr marL="0" indent="0">
-              <a:buNone/>
+            <a:pPr marL="514350" indent="-514350">
+              <a:buAutoNum type="arabicPeriod"/>
             </a:pPr>
             <a:r>
-              <a:rPr lang="en-US" b="1" smtClean="0">
+              <a:rPr lang="en-US" b="1" dirty="0" smtClean="0">
                 <a:solidFill>
                   <a:srgbClr val="FF0000"/>
                 </a:solidFill>
                 <a:latin typeface="Arial" pitchFamily="34" charset="0"/>
                 <a:cs typeface="Arial" pitchFamily="34" charset="0"/>
               </a:rPr>
-              <a:t>1. Nội dung nghiên cứu</a:t>
-            </a:r>
-          </a:p>
-          <a:p>
-            <a:pPr marL="0" indent="0">
-              <a:buNone/>
-            </a:pPr>
-            <a:r>
-              <a:rPr lang="en-US" smtClean="0">
+              <a:t>Nội </a:t>
+            </a:r>
+            <a:r>
+              <a:rPr lang="en-US" b="1" dirty="0" smtClean="0">
+                <a:solidFill>
+                  <a:srgbClr val="FF0000"/>
+                </a:solidFill>
                 <a:latin typeface="Arial" pitchFamily="34" charset="0"/>
                 <a:cs typeface="Arial" pitchFamily="34" charset="0"/>
               </a:rPr>
-              <a:t>	Nội </a:t>
-            </a:r>
-            <a:r>
-              <a:rPr lang="en-US">
+              <a:t>dung </a:t>
+            </a:r>
+            <a:r>
+              <a:rPr lang="en-US" b="1" dirty="0" smtClean="0">
+                <a:solidFill>
+                  <a:srgbClr val="FF0000"/>
+                </a:solidFill>
                 <a:latin typeface="Arial" pitchFamily="34" charset="0"/>
                 <a:cs typeface="Arial" pitchFamily="34" charset="0"/>
               </a:rPr>
-              <a:t>dung nghiên cứu của đề tài chủ yếu tập trung vào việc quản lý ban cán sự </a:t>
-            </a:r>
-            <a:r>
-              <a:rPr lang="en-US" smtClean="0">
+              <a:t>nghiên cứu</a:t>
+            </a:r>
+          </a:p>
+          <a:p>
+            <a:pPr marL="0" indent="0">
+              <a:buNone/>
+            </a:pPr>
+            <a:r>
+              <a:rPr lang="en-US" dirty="0" smtClean="0">
                 <a:latin typeface="Arial" pitchFamily="34" charset="0"/>
                 <a:cs typeface="Arial" pitchFamily="34" charset="0"/>
               </a:rPr>
-              <a:t>theo : </a:t>
-            </a:r>
-          </a:p>
-          <a:p>
-            <a:pPr lvl="1"/>
-            <a:r>
-              <a:rPr lang="en-US" smtClean="0">
+              <a:t>Quản lý ban cán sự: </a:t>
+            </a:r>
+          </a:p>
+          <a:p>
+            <a:pPr lvl="1">
+              <a:buFont typeface="Wingdings" panose="05000000000000000000" pitchFamily="2" charset="2"/>
+              <a:buChar char="q"/>
+            </a:pPr>
+            <a:r>
+              <a:rPr lang="en-US" dirty="0" smtClean="0">
                 <a:latin typeface="Arial" pitchFamily="34" charset="0"/>
                 <a:cs typeface="Arial" pitchFamily="34" charset="0"/>
               </a:rPr>
-              <a:t>Khóa học</a:t>
-            </a:r>
-            <a:endParaRPr lang="en-US" smtClean="0">
-              <a:latin typeface="Arial" pitchFamily="34" charset="0"/>
-              <a:cs typeface="Arial" pitchFamily="34" charset="0"/>
-            </a:endParaRPr>
-          </a:p>
-          <a:p>
-            <a:pPr lvl="1"/>
-            <a:r>
-              <a:rPr lang="en-US" smtClean="0">
+              <a:t> Khóa học</a:t>
+            </a:r>
+          </a:p>
+          <a:p>
+            <a:pPr lvl="1">
+              <a:buFont typeface="Wingdings" panose="05000000000000000000" pitchFamily="2" charset="2"/>
+              <a:buChar char="q"/>
+            </a:pPr>
+            <a:r>
+              <a:rPr lang="en-US" dirty="0" smtClean="0">
                 <a:latin typeface="Arial" pitchFamily="34" charset="0"/>
                 <a:cs typeface="Arial" pitchFamily="34" charset="0"/>
               </a:rPr>
-              <a:t>Bộ môn</a:t>
-            </a:r>
-          </a:p>
-          <a:p>
-            <a:pPr lvl="1"/>
-            <a:r>
-              <a:rPr lang="en-US" smtClean="0">
+              <a:t> Bộ môn</a:t>
+            </a:r>
+          </a:p>
+          <a:p>
+            <a:pPr lvl="1">
+              <a:buFont typeface="Wingdings" panose="05000000000000000000" pitchFamily="2" charset="2"/>
+              <a:buChar char="q"/>
+            </a:pPr>
+            <a:r>
+              <a:rPr lang="en-US" dirty="0" smtClean="0">
                 <a:latin typeface="Arial" pitchFamily="34" charset="0"/>
                 <a:cs typeface="Arial" pitchFamily="34" charset="0"/>
               </a:rPr>
-              <a:t>Lớp </a:t>
-            </a:r>
-          </a:p>
-          <a:p>
-            <a:pPr lvl="1"/>
-            <a:r>
-              <a:rPr lang="en-US" smtClean="0">
+              <a:t> Lớp </a:t>
+            </a:r>
+          </a:p>
+          <a:p>
+            <a:pPr lvl="1">
+              <a:buFont typeface="Wingdings" panose="05000000000000000000" pitchFamily="2" charset="2"/>
+              <a:buChar char="q"/>
+            </a:pPr>
+            <a:r>
+              <a:rPr lang="en-US" dirty="0" smtClean="0">
                 <a:latin typeface="Arial" pitchFamily="34" charset="0"/>
                 <a:cs typeface="Arial" pitchFamily="34" charset="0"/>
               </a:rPr>
-              <a:t>Cố vấn </a:t>
-            </a:r>
-            <a:r>
-              <a:rPr lang="en-US">
-                <a:latin typeface="Arial" pitchFamily="34" charset="0"/>
-                <a:cs typeface="Arial" pitchFamily="34" charset="0"/>
-              </a:rPr>
-              <a:t>học </a:t>
-            </a:r>
-            <a:r>
-              <a:rPr lang="en-US" smtClean="0">
-                <a:latin typeface="Arial" pitchFamily="34" charset="0"/>
-                <a:cs typeface="Arial" pitchFamily="34" charset="0"/>
-              </a:rPr>
-              <a:t>tập</a:t>
-            </a:r>
-            <a:endParaRPr lang="en-US">
-              <a:latin typeface="Arial" pitchFamily="34" charset="0"/>
-              <a:cs typeface="Arial" pitchFamily="34" charset="0"/>
-            </a:endParaRPr>
-          </a:p>
-          <a:p>
-            <a:endParaRPr lang="en-US"/>
+              <a:t> Cố vấn học tập</a:t>
+            </a:r>
+          </a:p>
+          <a:p>
+            <a:endParaRPr lang="en-US" dirty="0"/>
           </a:p>
         </p:txBody>
       </p:sp>
@@ -4028,7 +4766,274 @@
   <p:timing>
     <p:tnLst>
       <p:par>
-        <p:cTn id="1" dur="indefinite" restart="never" nodeType="tmRoot"/>
+        <p:cTn id="1" dur="indefinite" restart="never" nodeType="tmRoot">
+          <p:childTnLst>
+            <p:seq concurrent="1" nextAc="seek">
+              <p:cTn id="2" dur="indefinite" nodeType="mainSeq">
+                <p:childTnLst>
+                  <p:par>
+                    <p:cTn id="3" fill="hold">
+                      <p:stCondLst>
+                        <p:cond delay="indefinite"/>
+                      </p:stCondLst>
+                      <p:childTnLst>
+                        <p:par>
+                          <p:cTn id="4" fill="hold">
+                            <p:stCondLst>
+                              <p:cond delay="0"/>
+                            </p:stCondLst>
+                            <p:childTnLst>
+                              <p:par>
+                                <p:cTn id="5" presetID="16" presetClass="entr" presetSubtype="21" fill="hold" nodeType="clickEffect">
+                                  <p:stCondLst>
+                                    <p:cond delay="0"/>
+                                  </p:stCondLst>
+                                  <p:childTnLst>
+                                    <p:set>
+                                      <p:cBhvr>
+                                        <p:cTn id="6" dur="1" fill="hold">
+                                          <p:stCondLst>
+                                            <p:cond delay="0"/>
+                                          </p:stCondLst>
+                                        </p:cTn>
+                                        <p:tgtEl>
+                                          <p:spTgt spid="3">
+                                            <p:txEl>
+                                              <p:pRg st="2" end="2"/>
+                                            </p:txEl>
+                                          </p:spTgt>
+                                        </p:tgtEl>
+                                        <p:attrNameLst>
+                                          <p:attrName>style.visibility</p:attrName>
+                                        </p:attrNameLst>
+                                      </p:cBhvr>
+                                      <p:to>
+                                        <p:strVal val="visible"/>
+                                      </p:to>
+                                    </p:set>
+                                    <p:animEffect transition="in" filter="barn(inVertical)">
+                                      <p:cBhvr>
+                                        <p:cTn id="7" dur="500"/>
+                                        <p:tgtEl>
+                                          <p:spTgt spid="3">
+                                            <p:txEl>
+                                              <p:pRg st="2" end="2"/>
+                                            </p:txEl>
+                                          </p:spTgt>
+                                        </p:tgtEl>
+                                      </p:cBhvr>
+                                    </p:animEffect>
+                                  </p:childTnLst>
+                                </p:cTn>
+                              </p:par>
+                            </p:childTnLst>
+                          </p:cTn>
+                        </p:par>
+                      </p:childTnLst>
+                    </p:cTn>
+                  </p:par>
+                  <p:par>
+                    <p:cTn id="8" fill="hold">
+                      <p:stCondLst>
+                        <p:cond delay="indefinite"/>
+                      </p:stCondLst>
+                      <p:childTnLst>
+                        <p:par>
+                          <p:cTn id="9" fill="hold">
+                            <p:stCondLst>
+                              <p:cond delay="0"/>
+                            </p:stCondLst>
+                            <p:childTnLst>
+                              <p:par>
+                                <p:cTn id="10" presetID="16" presetClass="entr" presetSubtype="21" fill="hold" nodeType="clickEffect">
+                                  <p:stCondLst>
+                                    <p:cond delay="0"/>
+                                  </p:stCondLst>
+                                  <p:childTnLst>
+                                    <p:set>
+                                      <p:cBhvr>
+                                        <p:cTn id="11" dur="1" fill="hold">
+                                          <p:stCondLst>
+                                            <p:cond delay="0"/>
+                                          </p:stCondLst>
+                                        </p:cTn>
+                                        <p:tgtEl>
+                                          <p:spTgt spid="3">
+                                            <p:txEl>
+                                              <p:pRg st="3" end="3"/>
+                                            </p:txEl>
+                                          </p:spTgt>
+                                        </p:tgtEl>
+                                        <p:attrNameLst>
+                                          <p:attrName>style.visibility</p:attrName>
+                                        </p:attrNameLst>
+                                      </p:cBhvr>
+                                      <p:to>
+                                        <p:strVal val="visible"/>
+                                      </p:to>
+                                    </p:set>
+                                    <p:animEffect transition="in" filter="barn(inVertical)">
+                                      <p:cBhvr>
+                                        <p:cTn id="12" dur="500"/>
+                                        <p:tgtEl>
+                                          <p:spTgt spid="3">
+                                            <p:txEl>
+                                              <p:pRg st="3" end="3"/>
+                                            </p:txEl>
+                                          </p:spTgt>
+                                        </p:tgtEl>
+                                      </p:cBhvr>
+                                    </p:animEffect>
+                                  </p:childTnLst>
+                                </p:cTn>
+                              </p:par>
+                            </p:childTnLst>
+                          </p:cTn>
+                        </p:par>
+                      </p:childTnLst>
+                    </p:cTn>
+                  </p:par>
+                  <p:par>
+                    <p:cTn id="13" fill="hold">
+                      <p:stCondLst>
+                        <p:cond delay="indefinite"/>
+                      </p:stCondLst>
+                      <p:childTnLst>
+                        <p:par>
+                          <p:cTn id="14" fill="hold">
+                            <p:stCondLst>
+                              <p:cond delay="0"/>
+                            </p:stCondLst>
+                            <p:childTnLst>
+                              <p:par>
+                                <p:cTn id="15" presetID="16" presetClass="entr" presetSubtype="21" fill="hold" nodeType="clickEffect">
+                                  <p:stCondLst>
+                                    <p:cond delay="0"/>
+                                  </p:stCondLst>
+                                  <p:childTnLst>
+                                    <p:set>
+                                      <p:cBhvr>
+                                        <p:cTn id="16" dur="1" fill="hold">
+                                          <p:stCondLst>
+                                            <p:cond delay="0"/>
+                                          </p:stCondLst>
+                                        </p:cTn>
+                                        <p:tgtEl>
+                                          <p:spTgt spid="3">
+                                            <p:txEl>
+                                              <p:pRg st="4" end="4"/>
+                                            </p:txEl>
+                                          </p:spTgt>
+                                        </p:tgtEl>
+                                        <p:attrNameLst>
+                                          <p:attrName>style.visibility</p:attrName>
+                                        </p:attrNameLst>
+                                      </p:cBhvr>
+                                      <p:to>
+                                        <p:strVal val="visible"/>
+                                      </p:to>
+                                    </p:set>
+                                    <p:animEffect transition="in" filter="barn(inVertical)">
+                                      <p:cBhvr>
+                                        <p:cTn id="17" dur="500"/>
+                                        <p:tgtEl>
+                                          <p:spTgt spid="3">
+                                            <p:txEl>
+                                              <p:pRg st="4" end="4"/>
+                                            </p:txEl>
+                                          </p:spTgt>
+                                        </p:tgtEl>
+                                      </p:cBhvr>
+                                    </p:animEffect>
+                                  </p:childTnLst>
+                                </p:cTn>
+                              </p:par>
+                            </p:childTnLst>
+                          </p:cTn>
+                        </p:par>
+                      </p:childTnLst>
+                    </p:cTn>
+                  </p:par>
+                  <p:par>
+                    <p:cTn id="18" fill="hold">
+                      <p:stCondLst>
+                        <p:cond delay="indefinite"/>
+                      </p:stCondLst>
+                      <p:childTnLst>
+                        <p:par>
+                          <p:cTn id="19" fill="hold">
+                            <p:stCondLst>
+                              <p:cond delay="0"/>
+                            </p:stCondLst>
+                            <p:childTnLst>
+                              <p:par>
+                                <p:cTn id="20" presetID="16" presetClass="entr" presetSubtype="21" fill="hold" nodeType="clickEffect">
+                                  <p:stCondLst>
+                                    <p:cond delay="0"/>
+                                  </p:stCondLst>
+                                  <p:childTnLst>
+                                    <p:set>
+                                      <p:cBhvr>
+                                        <p:cTn id="21" dur="1" fill="hold">
+                                          <p:stCondLst>
+                                            <p:cond delay="0"/>
+                                          </p:stCondLst>
+                                        </p:cTn>
+                                        <p:tgtEl>
+                                          <p:spTgt spid="3">
+                                            <p:txEl>
+                                              <p:pRg st="5" end="5"/>
+                                            </p:txEl>
+                                          </p:spTgt>
+                                        </p:tgtEl>
+                                        <p:attrNameLst>
+                                          <p:attrName>style.visibility</p:attrName>
+                                        </p:attrNameLst>
+                                      </p:cBhvr>
+                                      <p:to>
+                                        <p:strVal val="visible"/>
+                                      </p:to>
+                                    </p:set>
+                                    <p:animEffect transition="in" filter="barn(inVertical)">
+                                      <p:cBhvr>
+                                        <p:cTn id="22" dur="500"/>
+                                        <p:tgtEl>
+                                          <p:spTgt spid="3">
+                                            <p:txEl>
+                                              <p:pRg st="5" end="5"/>
+                                            </p:txEl>
+                                          </p:spTgt>
+                                        </p:tgtEl>
+                                      </p:cBhvr>
+                                    </p:animEffect>
+                                  </p:childTnLst>
+                                </p:cTn>
+                              </p:par>
+                            </p:childTnLst>
+                          </p:cTn>
+                        </p:par>
+                      </p:childTnLst>
+                    </p:cTn>
+                  </p:par>
+                </p:childTnLst>
+              </p:cTn>
+              <p:prevCondLst>
+                <p:cond evt="onPrev" delay="0">
+                  <p:tgtEl>
+                    <p:sldTgt/>
+                  </p:tgtEl>
+                </p:cond>
+              </p:prevCondLst>
+              <p:nextCondLst>
+                <p:cond evt="onNext" delay="0">
+                  <p:tgtEl>
+                    <p:sldTgt/>
+                  </p:tgtEl>
+                </p:cond>
+              </p:nextCondLst>
+            </p:seq>
+          </p:childTnLst>
+        </p:cTn>
       </p:par>
     </p:tnLst>
   </p:timing>
@@ -4065,12 +5070,12 @@
         <p:spPr/>
         <p:txBody>
           <a:bodyPr>
-            <a:normAutofit fontScale="90000"/>
+            <a:noAutofit/>
           </a:bodyPr>
           <a:lstStyle/>
           <a:p>
             <a:r>
-              <a:rPr lang="en-US" b="1" smtClean="0">
+              <a:rPr lang="en-US" sz="3600" b="1" dirty="0" smtClean="0">
                 <a:solidFill>
                   <a:srgbClr val="FF0000"/>
                 </a:solidFill>
@@ -4079,7 +5084,7 @@
               </a:rPr>
               <a:t>II. NỘI DUNG, ĐỐI TƯỢNG, PHƯƠNG PHÁP NGHIÊN CỨU</a:t>
             </a:r>
-            <a:endParaRPr lang="en-US"/>
+            <a:endParaRPr lang="en-US" sz="3600" dirty="0"/>
           </a:p>
         </p:txBody>
       </p:sp>
@@ -4093,16 +5098,23 @@
             <p:ph idx="1"/>
           </p:nvPr>
         </p:nvSpPr>
-        <p:spPr/>
-        <p:txBody>
-          <a:bodyPr/>
+        <p:spPr>
+          <a:xfrm>
+            <a:off x="457200" y="1600200"/>
+            <a:ext cx="8458200" cy="5029200"/>
+          </a:xfrm>
+        </p:spPr>
+        <p:txBody>
+          <a:bodyPr>
+            <a:normAutofit/>
+          </a:bodyPr>
           <a:lstStyle/>
           <a:p>
             <a:pPr marL="0" indent="0">
               <a:buNone/>
             </a:pPr>
             <a:r>
-              <a:rPr lang="en-US" b="1" smtClean="0">
+              <a:rPr lang="en-US" b="1" dirty="0" smtClean="0">
                 <a:solidFill>
                   <a:srgbClr val="FF0000"/>
                 </a:solidFill>
@@ -4114,61 +5126,132 @@
           </a:p>
           <a:p>
             <a:r>
-              <a:rPr lang="en-US">
+              <a:rPr lang="en-US" dirty="0">
                 <a:latin typeface="Arial" pitchFamily="34" charset="0"/>
                 <a:cs typeface="Arial" pitchFamily="34" charset="0"/>
               </a:rPr>
-              <a:t>Đối tượng nghiên cứu của đề tài chủ yếu tập trung vào thống </a:t>
-            </a:r>
-            <a:r>
-              <a:rPr lang="en-US" smtClean="0">
+              <a:t>T</a:t>
+            </a:r>
+            <a:r>
+              <a:rPr lang="en-US" dirty="0" smtClean="0">
                 <a:latin typeface="Arial" pitchFamily="34" charset="0"/>
                 <a:cs typeface="Arial" pitchFamily="34" charset="0"/>
               </a:rPr>
-              <a:t>kê </a:t>
-            </a:r>
-            <a:r>
-              <a:rPr lang="en-US">
+              <a:t>hống </a:t>
+            </a:r>
+            <a:r>
+              <a:rPr lang="en-US" dirty="0" smtClean="0">
                 <a:latin typeface="Arial" pitchFamily="34" charset="0"/>
                 <a:cs typeface="Arial" pitchFamily="34" charset="0"/>
               </a:rPr>
-              <a:t>ban cán sự theo khóa, theo bộ môn, theo </a:t>
-            </a:r>
-            <a:r>
-              <a:rPr lang="en-US" smtClean="0">
+              <a:t>kê </a:t>
+            </a:r>
+            <a:r>
+              <a:rPr lang="en-US" dirty="0">
                 <a:latin typeface="Arial" pitchFamily="34" charset="0"/>
                 <a:cs typeface="Arial" pitchFamily="34" charset="0"/>
               </a:rPr>
-              <a:t>lớp, theo CVHT.</a:t>
-            </a:r>
-            <a:endParaRPr lang="en-US">
+              <a:t>ban cán sự </a:t>
+            </a:r>
+            <a:r>
+              <a:rPr lang="en-US" dirty="0" smtClean="0">
+                <a:latin typeface="Arial" pitchFamily="34" charset="0"/>
+                <a:cs typeface="Arial" pitchFamily="34" charset="0"/>
+              </a:rPr>
+              <a:t>theo: </a:t>
+            </a:r>
+          </a:p>
+          <a:p>
+            <a:pPr lvl="1">
+              <a:buFont typeface="Wingdings" panose="05000000000000000000" pitchFamily="2" charset="2"/>
+              <a:buChar char="q"/>
+            </a:pPr>
+            <a:r>
+              <a:rPr lang="en-US" sz="3000" dirty="0" smtClean="0">
+                <a:latin typeface="Arial" pitchFamily="34" charset="0"/>
+                <a:cs typeface="Arial" pitchFamily="34" charset="0"/>
+              </a:rPr>
+              <a:t> K</a:t>
+            </a:r>
+            <a:r>
+              <a:rPr lang="en-US" sz="3000" dirty="0" smtClean="0">
+                <a:latin typeface="Arial" pitchFamily="34" charset="0"/>
+                <a:cs typeface="Arial" pitchFamily="34" charset="0"/>
+              </a:rPr>
+              <a:t>hóa</a:t>
+            </a:r>
+          </a:p>
+          <a:p>
+            <a:pPr lvl="1">
+              <a:buFont typeface="Wingdings" panose="05000000000000000000" pitchFamily="2" charset="2"/>
+              <a:buChar char="q"/>
+            </a:pPr>
+            <a:r>
+              <a:rPr lang="en-US" sz="3000" dirty="0" smtClean="0">
+                <a:latin typeface="Arial" pitchFamily="34" charset="0"/>
+                <a:cs typeface="Arial" pitchFamily="34" charset="0"/>
+              </a:rPr>
+              <a:t> Bộ môn</a:t>
+            </a:r>
+          </a:p>
+          <a:p>
+            <a:pPr lvl="1">
+              <a:buFont typeface="Wingdings" panose="05000000000000000000" pitchFamily="2" charset="2"/>
+              <a:buChar char="q"/>
+            </a:pPr>
+            <a:r>
+              <a:rPr lang="en-US" sz="3000" dirty="0" smtClean="0">
+                <a:latin typeface="Arial" pitchFamily="34" charset="0"/>
+                <a:cs typeface="Arial" pitchFamily="34" charset="0"/>
+              </a:rPr>
+              <a:t> L</a:t>
+            </a:r>
+            <a:r>
+              <a:rPr lang="en-US" sz="3000" dirty="0" smtClean="0">
+                <a:latin typeface="Arial" pitchFamily="34" charset="0"/>
+                <a:cs typeface="Arial" pitchFamily="34" charset="0"/>
+              </a:rPr>
+              <a:t>ớp</a:t>
+            </a:r>
+          </a:p>
+          <a:p>
+            <a:pPr lvl="1">
+              <a:buFont typeface="Wingdings" panose="05000000000000000000" pitchFamily="2" charset="2"/>
+              <a:buChar char="q"/>
+            </a:pPr>
+            <a:r>
+              <a:rPr lang="en-US" sz="3000" dirty="0" smtClean="0">
+                <a:latin typeface="Arial" pitchFamily="34" charset="0"/>
+                <a:cs typeface="Arial" pitchFamily="34" charset="0"/>
+              </a:rPr>
+              <a:t> CVHT</a:t>
+            </a:r>
+            <a:endParaRPr lang="en-US" sz="3000" dirty="0">
               <a:latin typeface="Arial" pitchFamily="34" charset="0"/>
               <a:cs typeface="Arial" pitchFamily="34" charset="0"/>
             </a:endParaRPr>
           </a:p>
           <a:p>
             <a:r>
-              <a:rPr lang="en-US">
+              <a:rPr lang="en-US" dirty="0" smtClean="0">
                 <a:latin typeface="Arial" pitchFamily="34" charset="0"/>
                 <a:cs typeface="Arial" pitchFamily="34" charset="0"/>
               </a:rPr>
-              <a:t>Người quản trị có toàn quyền hệ thống.</a:t>
-            </a:r>
-          </a:p>
-          <a:p>
-            <a:r>
-              <a:rPr lang="en-US">
+              <a:t>Cố </a:t>
+            </a:r>
+            <a:r>
+              <a:rPr lang="en-US" dirty="0">
                 <a:latin typeface="Arial" pitchFamily="34" charset="0"/>
                 <a:cs typeface="Arial" pitchFamily="34" charset="0"/>
               </a:rPr>
-              <a:t>Cố vấn học tập hay giảng viên, sinh viên có thể xem danh sách ban cán sự của các lớp.</a:t>
+              <a:t>vấn học tập hay giảng viên, sinh viên có thể xem danh sách ban cán sự của các lớp.</a:t>
             </a:r>
           </a:p>
           <a:p>
             <a:pPr marL="0" indent="0">
               <a:buNone/>
             </a:pPr>
-            <a:endParaRPr lang="en-US" b="1" smtClean="0">
+            <a:endParaRPr lang="en-US" sz="2800" b="1" dirty="0" smtClean="0">
               <a:solidFill>
                 <a:srgbClr val="FF0000"/>
               </a:solidFill>
@@ -4180,7 +5263,7 @@
             <a:pPr marL="0" indent="0">
               <a:buNone/>
             </a:pPr>
-            <a:endParaRPr lang="en-US" b="1">
+            <a:endParaRPr lang="en-US" sz="2800" b="1" dirty="0">
               <a:solidFill>
                 <a:srgbClr val="FF0000"/>
               </a:solidFill>
@@ -4203,7 +5286,396 @@
   <p:timing>
     <p:tnLst>
       <p:par>
-        <p:cTn id="1" dur="indefinite" restart="never" nodeType="tmRoot"/>
+        <p:cTn id="1" dur="indefinite" restart="never" nodeType="tmRoot">
+          <p:childTnLst>
+            <p:seq concurrent="1" nextAc="seek">
+              <p:cTn id="2" dur="indefinite" nodeType="mainSeq">
+                <p:childTnLst>
+                  <p:par>
+                    <p:cTn id="3" fill="hold">
+                      <p:stCondLst>
+                        <p:cond delay="indefinite"/>
+                      </p:stCondLst>
+                      <p:childTnLst>
+                        <p:par>
+                          <p:cTn id="4" fill="hold">
+                            <p:stCondLst>
+                              <p:cond delay="0"/>
+                            </p:stCondLst>
+                            <p:childTnLst>
+                              <p:par>
+                                <p:cTn id="5" presetID="16" presetClass="entr" presetSubtype="21" fill="hold" nodeType="clickEffect">
+                                  <p:stCondLst>
+                                    <p:cond delay="0"/>
+                                  </p:stCondLst>
+                                  <p:childTnLst>
+                                    <p:set>
+                                      <p:cBhvr>
+                                        <p:cTn id="6" dur="1" fill="hold">
+                                          <p:stCondLst>
+                                            <p:cond delay="0"/>
+                                          </p:stCondLst>
+                                        </p:cTn>
+                                        <p:tgtEl>
+                                          <p:spTgt spid="3">
+                                            <p:txEl>
+                                              <p:pRg st="1" end="1"/>
+                                            </p:txEl>
+                                          </p:spTgt>
+                                        </p:tgtEl>
+                                        <p:attrNameLst>
+                                          <p:attrName>style.visibility</p:attrName>
+                                        </p:attrNameLst>
+                                      </p:cBhvr>
+                                      <p:to>
+                                        <p:strVal val="visible"/>
+                                      </p:to>
+                                    </p:set>
+                                    <p:animEffect transition="in" filter="barn(inVertical)">
+                                      <p:cBhvr>
+                                        <p:cTn id="7" dur="500"/>
+                                        <p:tgtEl>
+                                          <p:spTgt spid="3">
+                                            <p:txEl>
+                                              <p:pRg st="1" end="1"/>
+                                            </p:txEl>
+                                          </p:spTgt>
+                                        </p:tgtEl>
+                                      </p:cBhvr>
+                                    </p:animEffect>
+                                  </p:childTnLst>
+                                </p:cTn>
+                              </p:par>
+                            </p:childTnLst>
+                          </p:cTn>
+                        </p:par>
+                      </p:childTnLst>
+                    </p:cTn>
+                  </p:par>
+                  <p:par>
+                    <p:cTn id="8" fill="hold">
+                      <p:stCondLst>
+                        <p:cond delay="indefinite"/>
+                      </p:stCondLst>
+                      <p:childTnLst>
+                        <p:par>
+                          <p:cTn id="9" fill="hold">
+                            <p:stCondLst>
+                              <p:cond delay="0"/>
+                            </p:stCondLst>
+                            <p:childTnLst>
+                              <p:par>
+                                <p:cTn id="10" presetID="16" presetClass="entr" presetSubtype="21" fill="hold" nodeType="clickEffect">
+                                  <p:stCondLst>
+                                    <p:cond delay="0"/>
+                                  </p:stCondLst>
+                                  <p:childTnLst>
+                                    <p:set>
+                                      <p:cBhvr>
+                                        <p:cTn id="11" dur="1" fill="hold">
+                                          <p:stCondLst>
+                                            <p:cond delay="0"/>
+                                          </p:stCondLst>
+                                        </p:cTn>
+                                        <p:tgtEl>
+                                          <p:spTgt spid="3">
+                                            <p:txEl>
+                                              <p:pRg st="2" end="2"/>
+                                            </p:txEl>
+                                          </p:spTgt>
+                                        </p:tgtEl>
+                                        <p:attrNameLst>
+                                          <p:attrName>style.visibility</p:attrName>
+                                        </p:attrNameLst>
+                                      </p:cBhvr>
+                                      <p:to>
+                                        <p:strVal val="visible"/>
+                                      </p:to>
+                                    </p:set>
+                                    <p:animEffect transition="in" filter="barn(inVertical)">
+                                      <p:cBhvr>
+                                        <p:cTn id="12" dur="500"/>
+                                        <p:tgtEl>
+                                          <p:spTgt spid="3">
+                                            <p:txEl>
+                                              <p:pRg st="2" end="2"/>
+                                            </p:txEl>
+                                          </p:spTgt>
+                                        </p:tgtEl>
+                                      </p:cBhvr>
+                                    </p:animEffect>
+                                  </p:childTnLst>
+                                </p:cTn>
+                              </p:par>
+                            </p:childTnLst>
+                          </p:cTn>
+                        </p:par>
+                      </p:childTnLst>
+                    </p:cTn>
+                  </p:par>
+                  <p:par>
+                    <p:cTn id="13" fill="hold">
+                      <p:stCondLst>
+                        <p:cond delay="indefinite"/>
+                      </p:stCondLst>
+                      <p:childTnLst>
+                        <p:par>
+                          <p:cTn id="14" fill="hold">
+                            <p:stCondLst>
+                              <p:cond delay="0"/>
+                            </p:stCondLst>
+                            <p:childTnLst>
+                              <p:par>
+                                <p:cTn id="15" presetID="16" presetClass="entr" presetSubtype="21" fill="hold" nodeType="clickEffect">
+                                  <p:stCondLst>
+                                    <p:cond delay="0"/>
+                                  </p:stCondLst>
+                                  <p:childTnLst>
+                                    <p:set>
+                                      <p:cBhvr>
+                                        <p:cTn id="16" dur="1" fill="hold">
+                                          <p:stCondLst>
+                                            <p:cond delay="0"/>
+                                          </p:stCondLst>
+                                        </p:cTn>
+                                        <p:tgtEl>
+                                          <p:spTgt spid="3">
+                                            <p:txEl>
+                                              <p:pRg st="3" end="3"/>
+                                            </p:txEl>
+                                          </p:spTgt>
+                                        </p:tgtEl>
+                                        <p:attrNameLst>
+                                          <p:attrName>style.visibility</p:attrName>
+                                        </p:attrNameLst>
+                                      </p:cBhvr>
+                                      <p:to>
+                                        <p:strVal val="visible"/>
+                                      </p:to>
+                                    </p:set>
+                                    <p:animEffect transition="in" filter="barn(inVertical)">
+                                      <p:cBhvr>
+                                        <p:cTn id="17" dur="500"/>
+                                        <p:tgtEl>
+                                          <p:spTgt spid="3">
+                                            <p:txEl>
+                                              <p:pRg st="3" end="3"/>
+                                            </p:txEl>
+                                          </p:spTgt>
+                                        </p:tgtEl>
+                                      </p:cBhvr>
+                                    </p:animEffect>
+                                  </p:childTnLst>
+                                </p:cTn>
+                              </p:par>
+                            </p:childTnLst>
+                          </p:cTn>
+                        </p:par>
+                      </p:childTnLst>
+                    </p:cTn>
+                  </p:par>
+                  <p:par>
+                    <p:cTn id="18" fill="hold">
+                      <p:stCondLst>
+                        <p:cond delay="indefinite"/>
+                      </p:stCondLst>
+                      <p:childTnLst>
+                        <p:par>
+                          <p:cTn id="19" fill="hold">
+                            <p:stCondLst>
+                              <p:cond delay="0"/>
+                            </p:stCondLst>
+                            <p:childTnLst>
+                              <p:par>
+                                <p:cTn id="20" presetID="16" presetClass="entr" presetSubtype="21" fill="hold" nodeType="clickEffect">
+                                  <p:stCondLst>
+                                    <p:cond delay="0"/>
+                                  </p:stCondLst>
+                                  <p:childTnLst>
+                                    <p:set>
+                                      <p:cBhvr>
+                                        <p:cTn id="21" dur="1" fill="hold">
+                                          <p:stCondLst>
+                                            <p:cond delay="0"/>
+                                          </p:stCondLst>
+                                        </p:cTn>
+                                        <p:tgtEl>
+                                          <p:spTgt spid="3">
+                                            <p:txEl>
+                                              <p:pRg st="4" end="4"/>
+                                            </p:txEl>
+                                          </p:spTgt>
+                                        </p:tgtEl>
+                                        <p:attrNameLst>
+                                          <p:attrName>style.visibility</p:attrName>
+                                        </p:attrNameLst>
+                                      </p:cBhvr>
+                                      <p:to>
+                                        <p:strVal val="visible"/>
+                                      </p:to>
+                                    </p:set>
+                                    <p:animEffect transition="in" filter="barn(inVertical)">
+                                      <p:cBhvr>
+                                        <p:cTn id="22" dur="500"/>
+                                        <p:tgtEl>
+                                          <p:spTgt spid="3">
+                                            <p:txEl>
+                                              <p:pRg st="4" end="4"/>
+                                            </p:txEl>
+                                          </p:spTgt>
+                                        </p:tgtEl>
+                                      </p:cBhvr>
+                                    </p:animEffect>
+                                  </p:childTnLst>
+                                </p:cTn>
+                              </p:par>
+                            </p:childTnLst>
+                          </p:cTn>
+                        </p:par>
+                      </p:childTnLst>
+                    </p:cTn>
+                  </p:par>
+                  <p:par>
+                    <p:cTn id="23" fill="hold">
+                      <p:stCondLst>
+                        <p:cond delay="indefinite"/>
+                      </p:stCondLst>
+                      <p:childTnLst>
+                        <p:par>
+                          <p:cTn id="24" fill="hold">
+                            <p:stCondLst>
+                              <p:cond delay="0"/>
+                            </p:stCondLst>
+                            <p:childTnLst>
+                              <p:par>
+                                <p:cTn id="25" presetID="16" presetClass="entr" presetSubtype="21" fill="hold" nodeType="clickEffect">
+                                  <p:stCondLst>
+                                    <p:cond delay="0"/>
+                                  </p:stCondLst>
+                                  <p:childTnLst>
+                                    <p:set>
+                                      <p:cBhvr>
+                                        <p:cTn id="26" dur="1" fill="hold">
+                                          <p:stCondLst>
+                                            <p:cond delay="0"/>
+                                          </p:stCondLst>
+                                        </p:cTn>
+                                        <p:tgtEl>
+                                          <p:spTgt spid="3">
+                                            <p:txEl>
+                                              <p:pRg st="5" end="5"/>
+                                            </p:txEl>
+                                          </p:spTgt>
+                                        </p:tgtEl>
+                                        <p:attrNameLst>
+                                          <p:attrName>style.visibility</p:attrName>
+                                        </p:attrNameLst>
+                                      </p:cBhvr>
+                                      <p:to>
+                                        <p:strVal val="visible"/>
+                                      </p:to>
+                                    </p:set>
+                                    <p:animEffect transition="in" filter="barn(inVertical)">
+                                      <p:cBhvr>
+                                        <p:cTn id="27" dur="500"/>
+                                        <p:tgtEl>
+                                          <p:spTgt spid="3">
+                                            <p:txEl>
+                                              <p:pRg st="5" end="5"/>
+                                            </p:txEl>
+                                          </p:spTgt>
+                                        </p:tgtEl>
+                                      </p:cBhvr>
+                                    </p:animEffect>
+                                  </p:childTnLst>
+                                </p:cTn>
+                              </p:par>
+                            </p:childTnLst>
+                          </p:cTn>
+                        </p:par>
+                      </p:childTnLst>
+                    </p:cTn>
+                  </p:par>
+                  <p:par>
+                    <p:cTn id="28" fill="hold">
+                      <p:stCondLst>
+                        <p:cond delay="indefinite"/>
+                      </p:stCondLst>
+                      <p:childTnLst>
+                        <p:par>
+                          <p:cTn id="29" fill="hold">
+                            <p:stCondLst>
+                              <p:cond delay="0"/>
+                            </p:stCondLst>
+                            <p:childTnLst>
+                              <p:par>
+                                <p:cTn id="30" presetID="16" presetClass="entr" presetSubtype="21" fill="hold" nodeType="clickEffect">
+                                  <p:stCondLst>
+                                    <p:cond delay="0"/>
+                                  </p:stCondLst>
+                                  <p:childTnLst>
+                                    <p:set>
+                                      <p:cBhvr>
+                                        <p:cTn id="31" dur="1" fill="hold">
+                                          <p:stCondLst>
+                                            <p:cond delay="0"/>
+                                          </p:stCondLst>
+                                        </p:cTn>
+                                        <p:tgtEl>
+                                          <p:spTgt spid="3">
+                                            <p:txEl>
+                                              <p:pRg st="6" end="6"/>
+                                            </p:txEl>
+                                          </p:spTgt>
+                                        </p:tgtEl>
+                                        <p:attrNameLst>
+                                          <p:attrName>style.visibility</p:attrName>
+                                        </p:attrNameLst>
+                                      </p:cBhvr>
+                                      <p:to>
+                                        <p:strVal val="visible"/>
+                                      </p:to>
+                                    </p:set>
+                                    <p:animEffect transition="in" filter="barn(inVertical)">
+                                      <p:cBhvr>
+                                        <p:cTn id="32" dur="500"/>
+                                        <p:tgtEl>
+                                          <p:spTgt spid="3">
+                                            <p:txEl>
+                                              <p:pRg st="6" end="6"/>
+                                            </p:txEl>
+                                          </p:spTgt>
+                                        </p:tgtEl>
+                                      </p:cBhvr>
+                                    </p:animEffect>
+                                  </p:childTnLst>
+                                </p:cTn>
+                              </p:par>
+                            </p:childTnLst>
+                          </p:cTn>
+                        </p:par>
+                      </p:childTnLst>
+                    </p:cTn>
+                  </p:par>
+                </p:childTnLst>
+              </p:cTn>
+              <p:prevCondLst>
+                <p:cond evt="onPrev" delay="0">
+                  <p:tgtEl>
+                    <p:sldTgt/>
+                  </p:tgtEl>
+                </p:cond>
+              </p:prevCondLst>
+              <p:nextCondLst>
+                <p:cond evt="onNext" delay="0">
+                  <p:tgtEl>
+                    <p:sldTgt/>
+                  </p:tgtEl>
+                </p:cond>
+              </p:nextCondLst>
+            </p:seq>
+          </p:childTnLst>
+        </p:cTn>
       </p:par>
     </p:tnLst>
   </p:timing>
@@ -4277,7 +5749,7 @@
               <a:buNone/>
             </a:pPr>
             <a:r>
-              <a:rPr lang="en-US" b="1" smtClean="0">
+              <a:rPr lang="en-US" b="1" dirty="0" smtClean="0">
                 <a:solidFill>
                   <a:srgbClr val="FF0000"/>
                 </a:solidFill>
@@ -4293,14 +5765,14 @@
               <a:buAutoNum type="alphaLcPeriod"/>
             </a:pPr>
             <a:r>
-              <a:rPr lang="en-US" b="1">
+              <a:rPr lang="en-US" b="1" dirty="0">
                 <a:latin typeface="Arial" pitchFamily="34" charset="0"/>
                 <a:cs typeface="Arial" pitchFamily="34" charset="0"/>
               </a:rPr>
               <a:t>Nghiên cứu lý </a:t>
             </a:r>
             <a:r>
-              <a:rPr lang="en-US" b="1" smtClean="0">
+              <a:rPr lang="en-US" b="1" dirty="0" smtClean="0">
                 <a:latin typeface="Arial" pitchFamily="34" charset="0"/>
                 <a:cs typeface="Arial" pitchFamily="34" charset="0"/>
               </a:rPr>
@@ -4308,48 +5780,81 @@
             </a:r>
           </a:p>
           <a:p>
-            <a:pPr lvl="1"/>
-            <a:r>
-              <a:rPr lang="en-US" smtClean="0">
+            <a:pPr lvl="1">
+              <a:buFont typeface="Wingdings" panose="05000000000000000000" pitchFamily="2" charset="2"/>
+              <a:buChar char="q"/>
+            </a:pPr>
+            <a:r>
+              <a:rPr lang="en-US" dirty="0" smtClean="0">
                 <a:latin typeface="Arial" pitchFamily="34" charset="0"/>
                 <a:cs typeface="Arial" pitchFamily="34" charset="0"/>
               </a:rPr>
-              <a:t>Framework Bootstrap</a:t>
-            </a:r>
-          </a:p>
-          <a:p>
-            <a:pPr lvl="1"/>
-            <a:r>
-              <a:rPr lang="en-US" smtClean="0">
+              <a:t> Framework Bootstrap</a:t>
+            </a:r>
+          </a:p>
+          <a:p>
+            <a:pPr lvl="1">
+              <a:buFont typeface="Wingdings" panose="05000000000000000000" pitchFamily="2" charset="2"/>
+              <a:buChar char="q"/>
+            </a:pPr>
+            <a:r>
+              <a:rPr lang="en-US" dirty="0">
                 <a:latin typeface="Arial" pitchFamily="34" charset="0"/>
                 <a:cs typeface="Arial" pitchFamily="34" charset="0"/>
               </a:rPr>
-              <a:t>Ngôn ngữ lập trình PHP</a:t>
-            </a:r>
-          </a:p>
-          <a:p>
-            <a:pPr lvl="1"/>
-            <a:r>
-              <a:rPr lang="en-US" smtClean="0">
+              <a:t> Cơ sở dữ liệu – </a:t>
+            </a:r>
+            <a:r>
+              <a:rPr lang="en-US" dirty="0" smtClean="0">
                 <a:latin typeface="Arial" pitchFamily="34" charset="0"/>
                 <a:cs typeface="Arial" pitchFamily="34" charset="0"/>
               </a:rPr>
-              <a:t>Framework Laravel</a:t>
-            </a:r>
-          </a:p>
-          <a:p>
-            <a:pPr lvl="1"/>
-            <a:r>
-              <a:rPr lang="en-US" smtClean="0">
-                <a:latin typeface="Arial" pitchFamily="34" charset="0"/>
-                <a:cs typeface="Arial" pitchFamily="34" charset="0"/>
-              </a:rPr>
-              <a:t>Cơ sở dữ liệu – MySQL</a:t>
-            </a:r>
-            <a:endParaRPr lang="en-US" b="1" smtClean="0">
+              <a:t>MySQL</a:t>
+            </a:r>
+            <a:endParaRPr lang="en-US" dirty="0" smtClean="0">
               <a:latin typeface="Arial" pitchFamily="34" charset="0"/>
               <a:cs typeface="Arial" pitchFamily="34" charset="0"/>
             </a:endParaRPr>
+          </a:p>
+          <a:p>
+            <a:pPr lvl="1">
+              <a:buFont typeface="Wingdings" panose="05000000000000000000" pitchFamily="2" charset="2"/>
+              <a:buChar char="q"/>
+            </a:pPr>
+            <a:r>
+              <a:rPr lang="en-US" dirty="0" smtClean="0">
+                <a:latin typeface="Arial" pitchFamily="34" charset="0"/>
+                <a:cs typeface="Arial" pitchFamily="34" charset="0"/>
+              </a:rPr>
+              <a:t> Ngôn </a:t>
+            </a:r>
+            <a:r>
+              <a:rPr lang="en-US" dirty="0" smtClean="0">
+                <a:latin typeface="Arial" pitchFamily="34" charset="0"/>
+                <a:cs typeface="Arial" pitchFamily="34" charset="0"/>
+              </a:rPr>
+              <a:t>ngữ lập trình PHP</a:t>
+            </a:r>
+          </a:p>
+          <a:p>
+            <a:pPr lvl="1">
+              <a:buFont typeface="Wingdings" panose="05000000000000000000" pitchFamily="2" charset="2"/>
+              <a:buChar char="q"/>
+            </a:pPr>
+            <a:r>
+              <a:rPr lang="en-US" dirty="0" smtClean="0">
+                <a:latin typeface="Arial" pitchFamily="34" charset="0"/>
+                <a:cs typeface="Arial" pitchFamily="34" charset="0"/>
+              </a:rPr>
+              <a:t> Framework </a:t>
+            </a:r>
+            <a:r>
+              <a:rPr lang="en-US" dirty="0" smtClean="0">
+                <a:latin typeface="Arial" pitchFamily="34" charset="0"/>
+                <a:cs typeface="Arial" pitchFamily="34" charset="0"/>
+              </a:rPr>
+              <a:t>Laravel</a:t>
+            </a:r>
           </a:p>
           <a:p>
             <a:pPr marL="514350" lvl="0" indent="-514350">
@@ -4357,29 +5862,36 @@
               <a:buAutoNum type="alphaLcPeriod"/>
             </a:pPr>
             <a:r>
-              <a:rPr lang="en-US" b="1" smtClean="0">
+              <a:rPr lang="en-US" b="1" dirty="0" smtClean="0">
                 <a:latin typeface="Arial" pitchFamily="34" charset="0"/>
                 <a:cs typeface="Arial" pitchFamily="34" charset="0"/>
               </a:rPr>
-              <a:t>Hiện thực hóa ứng dụng(Demo)</a:t>
-            </a:r>
-            <a:endParaRPr lang="en-US" b="1">
+              <a:t>Hiện </a:t>
+            </a:r>
+            <a:r>
+              <a:rPr lang="en-US" b="1" dirty="0" smtClean="0">
+                <a:latin typeface="Arial" pitchFamily="34" charset="0"/>
+                <a:cs typeface="Arial" pitchFamily="34" charset="0"/>
+              </a:rPr>
+              <a:t>thực hóa ứng </a:t>
+            </a:r>
+            <a:r>
+              <a:rPr lang="en-US" b="1" dirty="0" smtClean="0">
+                <a:latin typeface="Arial" pitchFamily="34" charset="0"/>
+                <a:cs typeface="Arial" pitchFamily="34" charset="0"/>
+              </a:rPr>
+              <a:t>dụng</a:t>
+            </a:r>
+            <a:endParaRPr lang="en-US" dirty="0">
               <a:latin typeface="Arial" pitchFamily="34" charset="0"/>
               <a:cs typeface="Arial" pitchFamily="34" charset="0"/>
             </a:endParaRPr>
           </a:p>
           <a:p>
-            <a:pPr lvl="1"/>
-            <a:endParaRPr lang="en-US">
-              <a:latin typeface="Arial" pitchFamily="34" charset="0"/>
-              <a:cs typeface="Arial" pitchFamily="34" charset="0"/>
-            </a:endParaRPr>
-          </a:p>
-          <a:p>
             <a:pPr marL="0" indent="0">
               <a:buNone/>
             </a:pPr>
-            <a:endParaRPr lang="en-US" b="1">
+            <a:endParaRPr lang="en-US" b="1" dirty="0">
               <a:solidFill>
                 <a:srgbClr val="FF0000"/>
               </a:solidFill>
@@ -4402,7 +5914,396 @@
   <p:timing>
     <p:tnLst>
       <p:par>
-        <p:cTn id="1" dur="indefinite" restart="never" nodeType="tmRoot"/>
+        <p:cTn id="1" dur="indefinite" restart="never" nodeType="tmRoot">
+          <p:childTnLst>
+            <p:seq concurrent="1" nextAc="seek">
+              <p:cTn id="2" dur="indefinite" nodeType="mainSeq">
+                <p:childTnLst>
+                  <p:par>
+                    <p:cTn id="3" fill="hold">
+                      <p:stCondLst>
+                        <p:cond delay="indefinite"/>
+                      </p:stCondLst>
+                      <p:childTnLst>
+                        <p:par>
+                          <p:cTn id="4" fill="hold">
+                            <p:stCondLst>
+                              <p:cond delay="0"/>
+                            </p:stCondLst>
+                            <p:childTnLst>
+                              <p:par>
+                                <p:cTn id="5" presetID="16" presetClass="entr" presetSubtype="21" fill="hold" nodeType="clickEffect">
+                                  <p:stCondLst>
+                                    <p:cond delay="0"/>
+                                  </p:stCondLst>
+                                  <p:childTnLst>
+                                    <p:set>
+                                      <p:cBhvr>
+                                        <p:cTn id="6" dur="1" fill="hold">
+                                          <p:stCondLst>
+                                            <p:cond delay="0"/>
+                                          </p:stCondLst>
+                                        </p:cTn>
+                                        <p:tgtEl>
+                                          <p:spTgt spid="3">
+                                            <p:txEl>
+                                              <p:pRg st="1" end="1"/>
+                                            </p:txEl>
+                                          </p:spTgt>
+                                        </p:tgtEl>
+                                        <p:attrNameLst>
+                                          <p:attrName>style.visibility</p:attrName>
+                                        </p:attrNameLst>
+                                      </p:cBhvr>
+                                      <p:to>
+                                        <p:strVal val="visible"/>
+                                      </p:to>
+                                    </p:set>
+                                    <p:animEffect transition="in" filter="barn(inVertical)">
+                                      <p:cBhvr>
+                                        <p:cTn id="7" dur="500"/>
+                                        <p:tgtEl>
+                                          <p:spTgt spid="3">
+                                            <p:txEl>
+                                              <p:pRg st="1" end="1"/>
+                                            </p:txEl>
+                                          </p:spTgt>
+                                        </p:tgtEl>
+                                      </p:cBhvr>
+                                    </p:animEffect>
+                                  </p:childTnLst>
+                                </p:cTn>
+                              </p:par>
+                            </p:childTnLst>
+                          </p:cTn>
+                        </p:par>
+                      </p:childTnLst>
+                    </p:cTn>
+                  </p:par>
+                  <p:par>
+                    <p:cTn id="8" fill="hold">
+                      <p:stCondLst>
+                        <p:cond delay="indefinite"/>
+                      </p:stCondLst>
+                      <p:childTnLst>
+                        <p:par>
+                          <p:cTn id="9" fill="hold">
+                            <p:stCondLst>
+                              <p:cond delay="0"/>
+                            </p:stCondLst>
+                            <p:childTnLst>
+                              <p:par>
+                                <p:cTn id="10" presetID="16" presetClass="entr" presetSubtype="21" fill="hold" nodeType="clickEffect">
+                                  <p:stCondLst>
+                                    <p:cond delay="0"/>
+                                  </p:stCondLst>
+                                  <p:childTnLst>
+                                    <p:set>
+                                      <p:cBhvr>
+                                        <p:cTn id="11" dur="1" fill="hold">
+                                          <p:stCondLst>
+                                            <p:cond delay="0"/>
+                                          </p:stCondLst>
+                                        </p:cTn>
+                                        <p:tgtEl>
+                                          <p:spTgt spid="3">
+                                            <p:txEl>
+                                              <p:pRg st="2" end="2"/>
+                                            </p:txEl>
+                                          </p:spTgt>
+                                        </p:tgtEl>
+                                        <p:attrNameLst>
+                                          <p:attrName>style.visibility</p:attrName>
+                                        </p:attrNameLst>
+                                      </p:cBhvr>
+                                      <p:to>
+                                        <p:strVal val="visible"/>
+                                      </p:to>
+                                    </p:set>
+                                    <p:animEffect transition="in" filter="barn(inVertical)">
+                                      <p:cBhvr>
+                                        <p:cTn id="12" dur="500"/>
+                                        <p:tgtEl>
+                                          <p:spTgt spid="3">
+                                            <p:txEl>
+                                              <p:pRg st="2" end="2"/>
+                                            </p:txEl>
+                                          </p:spTgt>
+                                        </p:tgtEl>
+                                      </p:cBhvr>
+                                    </p:animEffect>
+                                  </p:childTnLst>
+                                </p:cTn>
+                              </p:par>
+                            </p:childTnLst>
+                          </p:cTn>
+                        </p:par>
+                      </p:childTnLst>
+                    </p:cTn>
+                  </p:par>
+                  <p:par>
+                    <p:cTn id="13" fill="hold">
+                      <p:stCondLst>
+                        <p:cond delay="indefinite"/>
+                      </p:stCondLst>
+                      <p:childTnLst>
+                        <p:par>
+                          <p:cTn id="14" fill="hold">
+                            <p:stCondLst>
+                              <p:cond delay="0"/>
+                            </p:stCondLst>
+                            <p:childTnLst>
+                              <p:par>
+                                <p:cTn id="15" presetID="16" presetClass="entr" presetSubtype="21" fill="hold" nodeType="clickEffect">
+                                  <p:stCondLst>
+                                    <p:cond delay="0"/>
+                                  </p:stCondLst>
+                                  <p:childTnLst>
+                                    <p:set>
+                                      <p:cBhvr>
+                                        <p:cTn id="16" dur="1" fill="hold">
+                                          <p:stCondLst>
+                                            <p:cond delay="0"/>
+                                          </p:stCondLst>
+                                        </p:cTn>
+                                        <p:tgtEl>
+                                          <p:spTgt spid="3">
+                                            <p:txEl>
+                                              <p:pRg st="3" end="3"/>
+                                            </p:txEl>
+                                          </p:spTgt>
+                                        </p:tgtEl>
+                                        <p:attrNameLst>
+                                          <p:attrName>style.visibility</p:attrName>
+                                        </p:attrNameLst>
+                                      </p:cBhvr>
+                                      <p:to>
+                                        <p:strVal val="visible"/>
+                                      </p:to>
+                                    </p:set>
+                                    <p:animEffect transition="in" filter="barn(inVertical)">
+                                      <p:cBhvr>
+                                        <p:cTn id="17" dur="500"/>
+                                        <p:tgtEl>
+                                          <p:spTgt spid="3">
+                                            <p:txEl>
+                                              <p:pRg st="3" end="3"/>
+                                            </p:txEl>
+                                          </p:spTgt>
+                                        </p:tgtEl>
+                                      </p:cBhvr>
+                                    </p:animEffect>
+                                  </p:childTnLst>
+                                </p:cTn>
+                              </p:par>
+                            </p:childTnLst>
+                          </p:cTn>
+                        </p:par>
+                      </p:childTnLst>
+                    </p:cTn>
+                  </p:par>
+                  <p:par>
+                    <p:cTn id="18" fill="hold">
+                      <p:stCondLst>
+                        <p:cond delay="indefinite"/>
+                      </p:stCondLst>
+                      <p:childTnLst>
+                        <p:par>
+                          <p:cTn id="19" fill="hold">
+                            <p:stCondLst>
+                              <p:cond delay="0"/>
+                            </p:stCondLst>
+                            <p:childTnLst>
+                              <p:par>
+                                <p:cTn id="20" presetID="16" presetClass="entr" presetSubtype="21" fill="hold" nodeType="clickEffect">
+                                  <p:stCondLst>
+                                    <p:cond delay="0"/>
+                                  </p:stCondLst>
+                                  <p:childTnLst>
+                                    <p:set>
+                                      <p:cBhvr>
+                                        <p:cTn id="21" dur="1" fill="hold">
+                                          <p:stCondLst>
+                                            <p:cond delay="0"/>
+                                          </p:stCondLst>
+                                        </p:cTn>
+                                        <p:tgtEl>
+                                          <p:spTgt spid="3">
+                                            <p:txEl>
+                                              <p:pRg st="4" end="4"/>
+                                            </p:txEl>
+                                          </p:spTgt>
+                                        </p:tgtEl>
+                                        <p:attrNameLst>
+                                          <p:attrName>style.visibility</p:attrName>
+                                        </p:attrNameLst>
+                                      </p:cBhvr>
+                                      <p:to>
+                                        <p:strVal val="visible"/>
+                                      </p:to>
+                                    </p:set>
+                                    <p:animEffect transition="in" filter="barn(inVertical)">
+                                      <p:cBhvr>
+                                        <p:cTn id="22" dur="500"/>
+                                        <p:tgtEl>
+                                          <p:spTgt spid="3">
+                                            <p:txEl>
+                                              <p:pRg st="4" end="4"/>
+                                            </p:txEl>
+                                          </p:spTgt>
+                                        </p:tgtEl>
+                                      </p:cBhvr>
+                                    </p:animEffect>
+                                  </p:childTnLst>
+                                </p:cTn>
+                              </p:par>
+                            </p:childTnLst>
+                          </p:cTn>
+                        </p:par>
+                      </p:childTnLst>
+                    </p:cTn>
+                  </p:par>
+                  <p:par>
+                    <p:cTn id="23" fill="hold">
+                      <p:stCondLst>
+                        <p:cond delay="indefinite"/>
+                      </p:stCondLst>
+                      <p:childTnLst>
+                        <p:par>
+                          <p:cTn id="24" fill="hold">
+                            <p:stCondLst>
+                              <p:cond delay="0"/>
+                            </p:stCondLst>
+                            <p:childTnLst>
+                              <p:par>
+                                <p:cTn id="25" presetID="16" presetClass="entr" presetSubtype="21" fill="hold" nodeType="clickEffect">
+                                  <p:stCondLst>
+                                    <p:cond delay="0"/>
+                                  </p:stCondLst>
+                                  <p:childTnLst>
+                                    <p:set>
+                                      <p:cBhvr>
+                                        <p:cTn id="26" dur="1" fill="hold">
+                                          <p:stCondLst>
+                                            <p:cond delay="0"/>
+                                          </p:stCondLst>
+                                        </p:cTn>
+                                        <p:tgtEl>
+                                          <p:spTgt spid="3">
+                                            <p:txEl>
+                                              <p:pRg st="5" end="5"/>
+                                            </p:txEl>
+                                          </p:spTgt>
+                                        </p:tgtEl>
+                                        <p:attrNameLst>
+                                          <p:attrName>style.visibility</p:attrName>
+                                        </p:attrNameLst>
+                                      </p:cBhvr>
+                                      <p:to>
+                                        <p:strVal val="visible"/>
+                                      </p:to>
+                                    </p:set>
+                                    <p:animEffect transition="in" filter="barn(inVertical)">
+                                      <p:cBhvr>
+                                        <p:cTn id="27" dur="500"/>
+                                        <p:tgtEl>
+                                          <p:spTgt spid="3">
+                                            <p:txEl>
+                                              <p:pRg st="5" end="5"/>
+                                            </p:txEl>
+                                          </p:spTgt>
+                                        </p:tgtEl>
+                                      </p:cBhvr>
+                                    </p:animEffect>
+                                  </p:childTnLst>
+                                </p:cTn>
+                              </p:par>
+                            </p:childTnLst>
+                          </p:cTn>
+                        </p:par>
+                      </p:childTnLst>
+                    </p:cTn>
+                  </p:par>
+                  <p:par>
+                    <p:cTn id="28" fill="hold">
+                      <p:stCondLst>
+                        <p:cond delay="indefinite"/>
+                      </p:stCondLst>
+                      <p:childTnLst>
+                        <p:par>
+                          <p:cTn id="29" fill="hold">
+                            <p:stCondLst>
+                              <p:cond delay="0"/>
+                            </p:stCondLst>
+                            <p:childTnLst>
+                              <p:par>
+                                <p:cTn id="30" presetID="16" presetClass="entr" presetSubtype="21" fill="hold" nodeType="clickEffect">
+                                  <p:stCondLst>
+                                    <p:cond delay="0"/>
+                                  </p:stCondLst>
+                                  <p:childTnLst>
+                                    <p:set>
+                                      <p:cBhvr>
+                                        <p:cTn id="31" dur="1" fill="hold">
+                                          <p:stCondLst>
+                                            <p:cond delay="0"/>
+                                          </p:stCondLst>
+                                        </p:cTn>
+                                        <p:tgtEl>
+                                          <p:spTgt spid="3">
+                                            <p:txEl>
+                                              <p:pRg st="6" end="6"/>
+                                            </p:txEl>
+                                          </p:spTgt>
+                                        </p:tgtEl>
+                                        <p:attrNameLst>
+                                          <p:attrName>style.visibility</p:attrName>
+                                        </p:attrNameLst>
+                                      </p:cBhvr>
+                                      <p:to>
+                                        <p:strVal val="visible"/>
+                                      </p:to>
+                                    </p:set>
+                                    <p:animEffect transition="in" filter="barn(inVertical)">
+                                      <p:cBhvr>
+                                        <p:cTn id="32" dur="500"/>
+                                        <p:tgtEl>
+                                          <p:spTgt spid="3">
+                                            <p:txEl>
+                                              <p:pRg st="6" end="6"/>
+                                            </p:txEl>
+                                          </p:spTgt>
+                                        </p:tgtEl>
+                                      </p:cBhvr>
+                                    </p:animEffect>
+                                  </p:childTnLst>
+                                </p:cTn>
+                              </p:par>
+                            </p:childTnLst>
+                          </p:cTn>
+                        </p:par>
+                      </p:childTnLst>
+                    </p:cTn>
+                  </p:par>
+                </p:childTnLst>
+              </p:cTn>
+              <p:prevCondLst>
+                <p:cond evt="onPrev" delay="0">
+                  <p:tgtEl>
+                    <p:sldTgt/>
+                  </p:tgtEl>
+                </p:cond>
+              </p:prevCondLst>
+              <p:nextCondLst>
+                <p:cond evt="onNext" delay="0">
+                  <p:tgtEl>
+                    <p:sldTgt/>
+                  </p:tgtEl>
+                </p:cond>
+              </p:nextCondLst>
+            </p:seq>
+          </p:childTnLst>
+        </p:cTn>
       </p:par>
     </p:tnLst>
   </p:timing>
@@ -4438,29 +6339,138 @@
         </p:nvSpPr>
         <p:spPr/>
         <p:txBody>
+          <a:bodyPr>
+            <a:noAutofit/>
+          </a:bodyPr>
+          <a:lstStyle/>
+          <a:p>
+            <a:pPr algn="l"/>
+            <a:r>
+              <a:rPr lang="en-US" sz="3600" b="1" dirty="0" smtClean="0">
+                <a:solidFill>
+                  <a:srgbClr val="FF0000"/>
+                </a:solidFill>
+                <a:latin typeface="Arial" panose="020B0604020202020204" pitchFamily="34" charset="0"/>
+                <a:cs typeface="Arial" panose="020B0604020202020204" pitchFamily="34" charset="0"/>
+              </a:rPr>
+              <a:t>III. KẾT LUẬN VÀ HƯỚNG PHÁT TRIỂN</a:t>
+            </a:r>
+            <a:endParaRPr lang="en-US" sz="3600" b="1" dirty="0">
+              <a:solidFill>
+                <a:srgbClr val="FF0000"/>
+              </a:solidFill>
+              <a:latin typeface="Arial" panose="020B0604020202020204" pitchFamily="34" charset="0"/>
+              <a:cs typeface="Arial" panose="020B0604020202020204" pitchFamily="34" charset="0"/>
+            </a:endParaRPr>
+          </a:p>
+        </p:txBody>
+      </p:sp>
+      <p:sp>
+        <p:nvSpPr>
+          <p:cNvPr id="3" name="Content Placeholder 2"/>
+          <p:cNvSpPr>
+            <a:spLocks noGrp="1"/>
+          </p:cNvSpPr>
+          <p:nvPr>
+            <p:ph idx="1"/>
+          </p:nvPr>
+        </p:nvSpPr>
+        <p:spPr/>
+        <p:txBody>
           <a:bodyPr/>
           <a:lstStyle/>
           <a:p>
-            <a:endParaRPr lang="en-US"/>
-          </a:p>
-        </p:txBody>
-      </p:sp>
-      <p:sp>
-        <p:nvSpPr>
-          <p:cNvPr id="3" name="Content Placeholder 2"/>
-          <p:cNvSpPr>
-            <a:spLocks noGrp="1"/>
-          </p:cNvSpPr>
-          <p:nvPr>
-            <p:ph idx="1"/>
-          </p:nvPr>
-        </p:nvSpPr>
-        <p:spPr/>
-        <p:txBody>
-          <a:bodyPr/>
-          <a:lstStyle/>
-          <a:p>
-            <a:endParaRPr lang="en-US"/>
+            <a:pPr>
+              <a:buFont typeface="Wingdings" panose="05000000000000000000" pitchFamily="2" charset="2"/>
+              <a:buChar char="Ø"/>
+            </a:pPr>
+            <a:r>
+              <a:rPr lang="en-US" dirty="0" smtClean="0">
+                <a:latin typeface="Arial" panose="020B0604020202020204" pitchFamily="34" charset="0"/>
+                <a:cs typeface="Arial" panose="020B0604020202020204" pitchFamily="34" charset="0"/>
+              </a:rPr>
+              <a:t> Hệ thống đã hoàn thành:</a:t>
+            </a:r>
+          </a:p>
+          <a:p>
+            <a:pPr lvl="1">
+              <a:buFont typeface="Wingdings" panose="05000000000000000000" pitchFamily="2" charset="2"/>
+              <a:buChar char="q"/>
+            </a:pPr>
+            <a:r>
+              <a:rPr lang="en-US" sz="3000" dirty="0" smtClean="0">
+                <a:latin typeface="Arial" panose="020B0604020202020204" pitchFamily="34" charset="0"/>
+                <a:cs typeface="Arial" panose="020B0604020202020204" pitchFamily="34" charset="0"/>
+              </a:rPr>
+              <a:t> Xem </a:t>
+            </a:r>
+            <a:r>
+              <a:rPr lang="en-US" sz="3000" dirty="0">
+                <a:latin typeface="Arial" panose="020B0604020202020204" pitchFamily="34" charset="0"/>
+                <a:cs typeface="Arial" panose="020B0604020202020204" pitchFamily="34" charset="0"/>
+              </a:rPr>
+              <a:t>thông tin các ban cán sự </a:t>
+            </a:r>
+            <a:r>
+              <a:rPr lang="en-US" sz="3000" dirty="0" smtClean="0">
+                <a:latin typeface="Arial" panose="020B0604020202020204" pitchFamily="34" charset="0"/>
+                <a:cs typeface="Arial" panose="020B0604020202020204" pitchFamily="34" charset="0"/>
+              </a:rPr>
+              <a:t>lớp.</a:t>
+            </a:r>
+          </a:p>
+          <a:p>
+            <a:pPr lvl="1">
+              <a:buFont typeface="Wingdings" panose="05000000000000000000" pitchFamily="2" charset="2"/>
+              <a:buChar char="q"/>
+            </a:pPr>
+            <a:r>
+              <a:rPr lang="en-US" sz="3000" dirty="0" smtClean="0">
+                <a:latin typeface="Arial" panose="020B0604020202020204" pitchFamily="34" charset="0"/>
+                <a:cs typeface="Arial" panose="020B0604020202020204" pitchFamily="34" charset="0"/>
+              </a:rPr>
+              <a:t> Lọc </a:t>
+            </a:r>
+            <a:r>
+              <a:rPr lang="en-US" sz="3000" dirty="0">
+                <a:latin typeface="Arial" panose="020B0604020202020204" pitchFamily="34" charset="0"/>
+                <a:cs typeface="Arial" panose="020B0604020202020204" pitchFamily="34" charset="0"/>
+              </a:rPr>
+              <a:t>thông tin theo bộ môn, khóa, lớp và cố vấn. </a:t>
+            </a:r>
+            <a:endParaRPr lang="en-US" sz="3000" dirty="0" smtClean="0">
+              <a:latin typeface="Arial" panose="020B0604020202020204" pitchFamily="34" charset="0"/>
+              <a:cs typeface="Arial" panose="020B0604020202020204" pitchFamily="34" charset="0"/>
+            </a:endParaRPr>
+          </a:p>
+          <a:p>
+            <a:pPr lvl="1">
+              <a:buFont typeface="Wingdings" panose="05000000000000000000" pitchFamily="2" charset="2"/>
+              <a:buChar char="q"/>
+            </a:pPr>
+            <a:r>
+              <a:rPr lang="en-US" sz="3000" dirty="0" smtClean="0">
+                <a:latin typeface="Arial" panose="020B0604020202020204" pitchFamily="34" charset="0"/>
+                <a:cs typeface="Arial" panose="020B0604020202020204" pitchFamily="34" charset="0"/>
+              </a:rPr>
+              <a:t> Về </a:t>
+            </a:r>
+            <a:r>
+              <a:rPr lang="en-US" sz="3000" dirty="0">
+                <a:latin typeface="Arial" panose="020B0604020202020204" pitchFamily="34" charset="0"/>
+                <a:cs typeface="Arial" panose="020B0604020202020204" pitchFamily="34" charset="0"/>
+              </a:rPr>
+              <a:t>phần người quản trị thì các chức năng thêm, sửa, xóa thông tin của ban cán sự các lớp đã hoàn thành.</a:t>
+            </a:r>
+          </a:p>
+          <a:p>
+            <a:pPr marL="0" indent="0">
+              <a:buNone/>
+            </a:pPr>
+            <a:endParaRPr lang="en-US" dirty="0">
+              <a:latin typeface="Arial" panose="020B0604020202020204" pitchFamily="34" charset="0"/>
+              <a:cs typeface="Arial" panose="020B0604020202020204" pitchFamily="34" charset="0"/>
+            </a:endParaRPr>
           </a:p>
         </p:txBody>
       </p:sp>
@@ -4468,6 +6478,677 @@
     <p:extLst>
       <p:ext uri="{BB962C8B-B14F-4D97-AF65-F5344CB8AC3E}">
         <p14:creationId xmlns:p14="http://schemas.microsoft.com/office/powerpoint/2010/main" val="3614279422"/>
+      </p:ext>
+    </p:extLst>
+  </p:cSld>
+  <p:clrMapOvr>
+    <a:masterClrMapping/>
+  </p:clrMapOvr>
+  <p:timing>
+    <p:tnLst>
+      <p:par>
+        <p:cTn id="1" dur="indefinite" restart="never" nodeType="tmRoot">
+          <p:childTnLst>
+            <p:seq concurrent="1" nextAc="seek">
+              <p:cTn id="2" dur="indefinite" nodeType="mainSeq">
+                <p:childTnLst>
+                  <p:par>
+                    <p:cTn id="3" fill="hold">
+                      <p:stCondLst>
+                        <p:cond delay="indefinite"/>
+                      </p:stCondLst>
+                      <p:childTnLst>
+                        <p:par>
+                          <p:cTn id="4" fill="hold">
+                            <p:stCondLst>
+                              <p:cond delay="0"/>
+                            </p:stCondLst>
+                            <p:childTnLst>
+                              <p:par>
+                                <p:cTn id="5" presetID="16" presetClass="entr" presetSubtype="21" fill="hold" nodeType="clickEffect">
+                                  <p:stCondLst>
+                                    <p:cond delay="0"/>
+                                  </p:stCondLst>
+                                  <p:childTnLst>
+                                    <p:set>
+                                      <p:cBhvr>
+                                        <p:cTn id="6" dur="1" fill="hold">
+                                          <p:stCondLst>
+                                            <p:cond delay="0"/>
+                                          </p:stCondLst>
+                                        </p:cTn>
+                                        <p:tgtEl>
+                                          <p:spTgt spid="3">
+                                            <p:txEl>
+                                              <p:pRg st="0" end="0"/>
+                                            </p:txEl>
+                                          </p:spTgt>
+                                        </p:tgtEl>
+                                        <p:attrNameLst>
+                                          <p:attrName>style.visibility</p:attrName>
+                                        </p:attrNameLst>
+                                      </p:cBhvr>
+                                      <p:to>
+                                        <p:strVal val="visible"/>
+                                      </p:to>
+                                    </p:set>
+                                    <p:animEffect transition="in" filter="barn(inVertical)">
+                                      <p:cBhvr>
+                                        <p:cTn id="7" dur="500"/>
+                                        <p:tgtEl>
+                                          <p:spTgt spid="3">
+                                            <p:txEl>
+                                              <p:pRg st="0" end="0"/>
+                                            </p:txEl>
+                                          </p:spTgt>
+                                        </p:tgtEl>
+                                      </p:cBhvr>
+                                    </p:animEffect>
+                                  </p:childTnLst>
+                                </p:cTn>
+                              </p:par>
+                            </p:childTnLst>
+                          </p:cTn>
+                        </p:par>
+                      </p:childTnLst>
+                    </p:cTn>
+                  </p:par>
+                  <p:par>
+                    <p:cTn id="8" fill="hold">
+                      <p:stCondLst>
+                        <p:cond delay="indefinite"/>
+                      </p:stCondLst>
+                      <p:childTnLst>
+                        <p:par>
+                          <p:cTn id="9" fill="hold">
+                            <p:stCondLst>
+                              <p:cond delay="0"/>
+                            </p:stCondLst>
+                            <p:childTnLst>
+                              <p:par>
+                                <p:cTn id="10" presetID="16" presetClass="entr" presetSubtype="21" fill="hold" nodeType="clickEffect">
+                                  <p:stCondLst>
+                                    <p:cond delay="0"/>
+                                  </p:stCondLst>
+                                  <p:childTnLst>
+                                    <p:set>
+                                      <p:cBhvr>
+                                        <p:cTn id="11" dur="1" fill="hold">
+                                          <p:stCondLst>
+                                            <p:cond delay="0"/>
+                                          </p:stCondLst>
+                                        </p:cTn>
+                                        <p:tgtEl>
+                                          <p:spTgt spid="3">
+                                            <p:txEl>
+                                              <p:pRg st="1" end="1"/>
+                                            </p:txEl>
+                                          </p:spTgt>
+                                        </p:tgtEl>
+                                        <p:attrNameLst>
+                                          <p:attrName>style.visibility</p:attrName>
+                                        </p:attrNameLst>
+                                      </p:cBhvr>
+                                      <p:to>
+                                        <p:strVal val="visible"/>
+                                      </p:to>
+                                    </p:set>
+                                    <p:animEffect transition="in" filter="barn(inVertical)">
+                                      <p:cBhvr>
+                                        <p:cTn id="12" dur="500"/>
+                                        <p:tgtEl>
+                                          <p:spTgt spid="3">
+                                            <p:txEl>
+                                              <p:pRg st="1" end="1"/>
+                                            </p:txEl>
+                                          </p:spTgt>
+                                        </p:tgtEl>
+                                      </p:cBhvr>
+                                    </p:animEffect>
+                                  </p:childTnLst>
+                                </p:cTn>
+                              </p:par>
+                            </p:childTnLst>
+                          </p:cTn>
+                        </p:par>
+                      </p:childTnLst>
+                    </p:cTn>
+                  </p:par>
+                  <p:par>
+                    <p:cTn id="13" fill="hold">
+                      <p:stCondLst>
+                        <p:cond delay="indefinite"/>
+                      </p:stCondLst>
+                      <p:childTnLst>
+                        <p:par>
+                          <p:cTn id="14" fill="hold">
+                            <p:stCondLst>
+                              <p:cond delay="0"/>
+                            </p:stCondLst>
+                            <p:childTnLst>
+                              <p:par>
+                                <p:cTn id="15" presetID="16" presetClass="entr" presetSubtype="21" fill="hold" nodeType="clickEffect">
+                                  <p:stCondLst>
+                                    <p:cond delay="0"/>
+                                  </p:stCondLst>
+                                  <p:childTnLst>
+                                    <p:set>
+                                      <p:cBhvr>
+                                        <p:cTn id="16" dur="1" fill="hold">
+                                          <p:stCondLst>
+                                            <p:cond delay="0"/>
+                                          </p:stCondLst>
+                                        </p:cTn>
+                                        <p:tgtEl>
+                                          <p:spTgt spid="3">
+                                            <p:txEl>
+                                              <p:pRg st="2" end="2"/>
+                                            </p:txEl>
+                                          </p:spTgt>
+                                        </p:tgtEl>
+                                        <p:attrNameLst>
+                                          <p:attrName>style.visibility</p:attrName>
+                                        </p:attrNameLst>
+                                      </p:cBhvr>
+                                      <p:to>
+                                        <p:strVal val="visible"/>
+                                      </p:to>
+                                    </p:set>
+                                    <p:animEffect transition="in" filter="barn(inVertical)">
+                                      <p:cBhvr>
+                                        <p:cTn id="17" dur="500"/>
+                                        <p:tgtEl>
+                                          <p:spTgt spid="3">
+                                            <p:txEl>
+                                              <p:pRg st="2" end="2"/>
+                                            </p:txEl>
+                                          </p:spTgt>
+                                        </p:tgtEl>
+                                      </p:cBhvr>
+                                    </p:animEffect>
+                                  </p:childTnLst>
+                                </p:cTn>
+                              </p:par>
+                            </p:childTnLst>
+                          </p:cTn>
+                        </p:par>
+                      </p:childTnLst>
+                    </p:cTn>
+                  </p:par>
+                  <p:par>
+                    <p:cTn id="18" fill="hold">
+                      <p:stCondLst>
+                        <p:cond delay="indefinite"/>
+                      </p:stCondLst>
+                      <p:childTnLst>
+                        <p:par>
+                          <p:cTn id="19" fill="hold">
+                            <p:stCondLst>
+                              <p:cond delay="0"/>
+                            </p:stCondLst>
+                            <p:childTnLst>
+                              <p:par>
+                                <p:cTn id="20" presetID="16" presetClass="entr" presetSubtype="21" fill="hold" nodeType="clickEffect">
+                                  <p:stCondLst>
+                                    <p:cond delay="0"/>
+                                  </p:stCondLst>
+                                  <p:childTnLst>
+                                    <p:set>
+                                      <p:cBhvr>
+                                        <p:cTn id="21" dur="1" fill="hold">
+                                          <p:stCondLst>
+                                            <p:cond delay="0"/>
+                                          </p:stCondLst>
+                                        </p:cTn>
+                                        <p:tgtEl>
+                                          <p:spTgt spid="3">
+                                            <p:txEl>
+                                              <p:pRg st="3" end="3"/>
+                                            </p:txEl>
+                                          </p:spTgt>
+                                        </p:tgtEl>
+                                        <p:attrNameLst>
+                                          <p:attrName>style.visibility</p:attrName>
+                                        </p:attrNameLst>
+                                      </p:cBhvr>
+                                      <p:to>
+                                        <p:strVal val="visible"/>
+                                      </p:to>
+                                    </p:set>
+                                    <p:animEffect transition="in" filter="barn(inVertical)">
+                                      <p:cBhvr>
+                                        <p:cTn id="22" dur="500"/>
+                                        <p:tgtEl>
+                                          <p:spTgt spid="3">
+                                            <p:txEl>
+                                              <p:pRg st="3" end="3"/>
+                                            </p:txEl>
+                                          </p:spTgt>
+                                        </p:tgtEl>
+                                      </p:cBhvr>
+                                    </p:animEffect>
+                                  </p:childTnLst>
+                                </p:cTn>
+                              </p:par>
+                            </p:childTnLst>
+                          </p:cTn>
+                        </p:par>
+                      </p:childTnLst>
+                    </p:cTn>
+                  </p:par>
+                </p:childTnLst>
+              </p:cTn>
+              <p:prevCondLst>
+                <p:cond evt="onPrev" delay="0">
+                  <p:tgtEl>
+                    <p:sldTgt/>
+                  </p:tgtEl>
+                </p:cond>
+              </p:prevCondLst>
+              <p:nextCondLst>
+                <p:cond evt="onNext" delay="0">
+                  <p:tgtEl>
+                    <p:sldTgt/>
+                  </p:tgtEl>
+                </p:cond>
+              </p:nextCondLst>
+            </p:seq>
+          </p:childTnLst>
+        </p:cTn>
+      </p:par>
+    </p:tnLst>
+  </p:timing>
+</p:sld>
+</file>
+
+<file path=ppt/slides/slide8.xml><?xml version="1.0" encoding="utf-8"?>
+<p:sld xmlns:a="http://schemas.openxmlformats.org/drawingml/2006/main" xmlns:r="http://schemas.openxmlformats.org/officeDocument/2006/relationships" xmlns:p="http://schemas.openxmlformats.org/presentationml/2006/main">
+  <p:cSld>
+    <p:spTree>
+      <p:nvGrpSpPr>
+        <p:cNvPr id="1" name=""/>
+        <p:cNvGrpSpPr/>
+        <p:nvPr/>
+      </p:nvGrpSpPr>
+      <p:grpSpPr>
+        <a:xfrm>
+          <a:off x="0" y="0"/>
+          <a:ext cx="0" cy="0"/>
+          <a:chOff x="0" y="0"/>
+          <a:chExt cx="0" cy="0"/>
+        </a:xfrm>
+      </p:grpSpPr>
+      <p:sp>
+        <p:nvSpPr>
+          <p:cNvPr id="2" name="Title 1"/>
+          <p:cNvSpPr>
+            <a:spLocks noGrp="1"/>
+          </p:cNvSpPr>
+          <p:nvPr>
+            <p:ph type="title"/>
+          </p:nvPr>
+        </p:nvSpPr>
+        <p:spPr/>
+        <p:txBody>
+          <a:bodyPr>
+            <a:noAutofit/>
+          </a:bodyPr>
+          <a:lstStyle/>
+          <a:p>
+            <a:pPr algn="l"/>
+            <a:r>
+              <a:rPr lang="en-US" sz="3600" b="1" dirty="0" smtClean="0">
+                <a:solidFill>
+                  <a:srgbClr val="FF0000"/>
+                </a:solidFill>
+                <a:latin typeface="Arial" panose="020B0604020202020204" pitchFamily="34" charset="0"/>
+                <a:cs typeface="Arial" panose="020B0604020202020204" pitchFamily="34" charset="0"/>
+              </a:rPr>
+              <a:t>III. KẾT LUẬN VÀ HƯỚNG PHÁT TRIỂN</a:t>
+            </a:r>
+            <a:endParaRPr lang="en-US" sz="3600" b="1" dirty="0">
+              <a:solidFill>
+                <a:srgbClr val="FF0000"/>
+              </a:solidFill>
+              <a:latin typeface="Arial" panose="020B0604020202020204" pitchFamily="34" charset="0"/>
+              <a:cs typeface="Arial" panose="020B0604020202020204" pitchFamily="34" charset="0"/>
+            </a:endParaRPr>
+          </a:p>
+        </p:txBody>
+      </p:sp>
+      <p:sp>
+        <p:nvSpPr>
+          <p:cNvPr id="3" name="Content Placeholder 2"/>
+          <p:cNvSpPr>
+            <a:spLocks noGrp="1"/>
+          </p:cNvSpPr>
+          <p:nvPr>
+            <p:ph idx="1"/>
+          </p:nvPr>
+        </p:nvSpPr>
+        <p:spPr>
+          <a:xfrm>
+            <a:off x="457200" y="1600201"/>
+            <a:ext cx="8229600" cy="1219200"/>
+          </a:xfrm>
+        </p:spPr>
+        <p:txBody>
+          <a:bodyPr/>
+          <a:lstStyle/>
+          <a:p>
+            <a:pPr>
+              <a:buFont typeface="Wingdings" panose="05000000000000000000" pitchFamily="2" charset="2"/>
+              <a:buChar char="Ø"/>
+            </a:pPr>
+            <a:r>
+              <a:rPr lang="en-US" dirty="0" smtClean="0">
+                <a:latin typeface="Arial" panose="020B0604020202020204" pitchFamily="34" charset="0"/>
+                <a:cs typeface="Arial" panose="020B0604020202020204" pitchFamily="34" charset="0"/>
+              </a:rPr>
+              <a:t> Hướng phát triển:</a:t>
+            </a:r>
+          </a:p>
+          <a:p>
+            <a:pPr marL="0" indent="0">
+              <a:buNone/>
+            </a:pPr>
+            <a:r>
+              <a:rPr lang="en-US" dirty="0" smtClean="0">
+                <a:latin typeface="Arial" panose="020B0604020202020204" pitchFamily="34" charset="0"/>
+                <a:cs typeface="Arial" panose="020B0604020202020204" pitchFamily="34" charset="0"/>
+              </a:rPr>
+              <a:t>	</a:t>
+            </a:r>
+            <a:endParaRPr lang="en-US" dirty="0">
+              <a:latin typeface="Arial" panose="020B0604020202020204" pitchFamily="34" charset="0"/>
+              <a:cs typeface="Arial" panose="020B0604020202020204" pitchFamily="34" charset="0"/>
+            </a:endParaRPr>
+          </a:p>
+        </p:txBody>
+      </p:sp>
+      <p:sp>
+        <p:nvSpPr>
+          <p:cNvPr id="4" name="TextBox 3"/>
+          <p:cNvSpPr txBox="1"/>
+          <p:nvPr/>
+        </p:nvSpPr>
+        <p:spPr>
+          <a:xfrm>
+            <a:off x="1219200" y="2189481"/>
+            <a:ext cx="7200900" cy="1569660"/>
+          </a:xfrm>
+          <a:prstGeom prst="rect">
+            <a:avLst/>
+          </a:prstGeom>
+          <a:noFill/>
+        </p:spPr>
+        <p:txBody>
+          <a:bodyPr wrap="square" rtlCol="0">
+            <a:spAutoFit/>
+          </a:bodyPr>
+          <a:lstStyle/>
+          <a:p>
+            <a:r>
+              <a:rPr lang="en-US" sz="3200" dirty="0">
+                <a:latin typeface="Arial" panose="020B0604020202020204" pitchFamily="34" charset="0"/>
+                <a:cs typeface="Arial" panose="020B0604020202020204" pitchFamily="34" charset="0"/>
+              </a:rPr>
+              <a:t>Phát triển ứng dụng này trên các </a:t>
+            </a:r>
+            <a:r>
+              <a:rPr lang="en-US" sz="3200" dirty="0" smtClean="0">
+                <a:latin typeface="Arial" panose="020B0604020202020204" pitchFamily="34" charset="0"/>
+                <a:cs typeface="Arial" panose="020B0604020202020204" pitchFamily="34" charset="0"/>
+              </a:rPr>
+              <a:t>thiết </a:t>
+            </a:r>
+            <a:r>
+              <a:rPr lang="en-US" sz="3200" dirty="0">
+                <a:latin typeface="Arial" panose="020B0604020202020204" pitchFamily="34" charset="0"/>
+                <a:cs typeface="Arial" panose="020B0604020202020204" pitchFamily="34" charset="0"/>
+              </a:rPr>
+              <a:t>bị di động.</a:t>
+            </a:r>
+          </a:p>
+          <a:p>
+            <a:endParaRPr lang="en-US" sz="3200" dirty="0"/>
+          </a:p>
+        </p:txBody>
+      </p:sp>
+    </p:spTree>
+    <p:extLst>
+      <p:ext uri="{BB962C8B-B14F-4D97-AF65-F5344CB8AC3E}">
+        <p14:creationId xmlns:p14="http://schemas.microsoft.com/office/powerpoint/2010/main" val="456040438"/>
+      </p:ext>
+    </p:extLst>
+  </p:cSld>
+  <p:clrMapOvr>
+    <a:masterClrMapping/>
+  </p:clrMapOvr>
+  <p:timing>
+    <p:tnLst>
+      <p:par>
+        <p:cTn id="1" dur="indefinite" restart="never" nodeType="tmRoot">
+          <p:childTnLst>
+            <p:seq concurrent="1" nextAc="seek">
+              <p:cTn id="2" dur="indefinite" nodeType="mainSeq">
+                <p:childTnLst>
+                  <p:par>
+                    <p:cTn id="3" fill="hold">
+                      <p:stCondLst>
+                        <p:cond delay="indefinite"/>
+                      </p:stCondLst>
+                      <p:childTnLst>
+                        <p:par>
+                          <p:cTn id="4" fill="hold">
+                            <p:stCondLst>
+                              <p:cond delay="0"/>
+                            </p:stCondLst>
+                            <p:childTnLst>
+                              <p:par>
+                                <p:cTn id="5" presetID="16" presetClass="entr" presetSubtype="21" fill="hold" nodeType="clickEffect">
+                                  <p:stCondLst>
+                                    <p:cond delay="0"/>
+                                  </p:stCondLst>
+                                  <p:childTnLst>
+                                    <p:set>
+                                      <p:cBhvr>
+                                        <p:cTn id="6" dur="1" fill="hold">
+                                          <p:stCondLst>
+                                            <p:cond delay="0"/>
+                                          </p:stCondLst>
+                                        </p:cTn>
+                                        <p:tgtEl>
+                                          <p:spTgt spid="3">
+                                            <p:txEl>
+                                              <p:pRg st="0" end="0"/>
+                                            </p:txEl>
+                                          </p:spTgt>
+                                        </p:tgtEl>
+                                        <p:attrNameLst>
+                                          <p:attrName>style.visibility</p:attrName>
+                                        </p:attrNameLst>
+                                      </p:cBhvr>
+                                      <p:to>
+                                        <p:strVal val="visible"/>
+                                      </p:to>
+                                    </p:set>
+                                    <p:animEffect transition="in" filter="barn(inVertical)">
+                                      <p:cBhvr>
+                                        <p:cTn id="7" dur="500"/>
+                                        <p:tgtEl>
+                                          <p:spTgt spid="3">
+                                            <p:txEl>
+                                              <p:pRg st="0" end="0"/>
+                                            </p:txEl>
+                                          </p:spTgt>
+                                        </p:tgtEl>
+                                      </p:cBhvr>
+                                    </p:animEffect>
+                                  </p:childTnLst>
+                                </p:cTn>
+                              </p:par>
+                            </p:childTnLst>
+                          </p:cTn>
+                        </p:par>
+                      </p:childTnLst>
+                    </p:cTn>
+                  </p:par>
+                  <p:par>
+                    <p:cTn id="8" fill="hold">
+                      <p:stCondLst>
+                        <p:cond delay="indefinite"/>
+                      </p:stCondLst>
+                      <p:childTnLst>
+                        <p:par>
+                          <p:cTn id="9" fill="hold">
+                            <p:stCondLst>
+                              <p:cond delay="0"/>
+                            </p:stCondLst>
+                            <p:childTnLst>
+                              <p:par>
+                                <p:cTn id="10" presetID="16" presetClass="entr" presetSubtype="21" fill="hold" nodeType="clickEffect">
+                                  <p:stCondLst>
+                                    <p:cond delay="0"/>
+                                  </p:stCondLst>
+                                  <p:childTnLst>
+                                    <p:set>
+                                      <p:cBhvr>
+                                        <p:cTn id="11" dur="1" fill="hold">
+                                          <p:stCondLst>
+                                            <p:cond delay="0"/>
+                                          </p:stCondLst>
+                                        </p:cTn>
+                                        <p:tgtEl>
+                                          <p:spTgt spid="4">
+                                            <p:txEl>
+                                              <p:pRg st="0" end="0"/>
+                                            </p:txEl>
+                                          </p:spTgt>
+                                        </p:tgtEl>
+                                        <p:attrNameLst>
+                                          <p:attrName>style.visibility</p:attrName>
+                                        </p:attrNameLst>
+                                      </p:cBhvr>
+                                      <p:to>
+                                        <p:strVal val="visible"/>
+                                      </p:to>
+                                    </p:set>
+                                    <p:animEffect transition="in" filter="barn(inVertical)">
+                                      <p:cBhvr>
+                                        <p:cTn id="12" dur="500"/>
+                                        <p:tgtEl>
+                                          <p:spTgt spid="4">
+                                            <p:txEl>
+                                              <p:pRg st="0" end="0"/>
+                                            </p:txEl>
+                                          </p:spTgt>
+                                        </p:tgtEl>
+                                      </p:cBhvr>
+                                    </p:animEffect>
+                                  </p:childTnLst>
+                                </p:cTn>
+                              </p:par>
+                            </p:childTnLst>
+                          </p:cTn>
+                        </p:par>
+                      </p:childTnLst>
+                    </p:cTn>
+                  </p:par>
+                </p:childTnLst>
+              </p:cTn>
+              <p:prevCondLst>
+                <p:cond evt="onPrev" delay="0">
+                  <p:tgtEl>
+                    <p:sldTgt/>
+                  </p:tgtEl>
+                </p:cond>
+              </p:prevCondLst>
+              <p:nextCondLst>
+                <p:cond evt="onNext" delay="0">
+                  <p:tgtEl>
+                    <p:sldTgt/>
+                  </p:tgtEl>
+                </p:cond>
+              </p:nextCondLst>
+            </p:seq>
+          </p:childTnLst>
+        </p:cTn>
+      </p:par>
+    </p:tnLst>
+  </p:timing>
+</p:sld>
+</file>
+
+<file path=ppt/slides/slide9.xml><?xml version="1.0" encoding="utf-8"?>
+<p:sld xmlns:a="http://schemas.openxmlformats.org/drawingml/2006/main" xmlns:r="http://schemas.openxmlformats.org/officeDocument/2006/relationships" xmlns:p="http://schemas.openxmlformats.org/presentationml/2006/main">
+  <p:cSld>
+    <p:spTree>
+      <p:nvGrpSpPr>
+        <p:cNvPr id="1" name=""/>
+        <p:cNvGrpSpPr/>
+        <p:nvPr/>
+      </p:nvGrpSpPr>
+      <p:grpSpPr>
+        <a:xfrm>
+          <a:off x="0" y="0"/>
+          <a:ext cx="0" cy="0"/>
+          <a:chOff x="0" y="0"/>
+          <a:chExt cx="0" cy="0"/>
+        </a:xfrm>
+      </p:grpSpPr>
+      <p:pic>
+        <p:nvPicPr>
+          <p:cNvPr id="1026" name="Picture 2" descr="Kết quả hình ảnh cho demo">
+            <a:hlinkClick r:id="rId2"/>
+          </p:cNvPr>
+          <p:cNvPicPr>
+            <a:picLocks noChangeAspect="1" noChangeArrowheads="1"/>
+          </p:cNvPicPr>
+          <p:nvPr/>
+        </p:nvPicPr>
+        <p:blipFill>
+          <a:blip r:embed="rId3">
+            <a:extLst>
+              <a:ext uri="{28A0092B-C50C-407E-A947-70E740481C1C}">
+                <a14:useLocalDpi xmlns:a14="http://schemas.microsoft.com/office/drawing/2010/main" val="0"/>
+              </a:ext>
+            </a:extLst>
+          </a:blip>
+          <a:srcRect/>
+          <a:stretch>
+            <a:fillRect/>
+          </a:stretch>
+        </p:blipFill>
+        <p:spPr bwMode="auto">
+          <a:xfrm>
+            <a:off x="1676400" y="1143000"/>
+            <a:ext cx="6096000" cy="4457700"/>
+          </a:xfrm>
+          <a:prstGeom prst="rect">
+            <a:avLst/>
+          </a:prstGeom>
+          <a:ln>
+            <a:noFill/>
+          </a:ln>
+          <a:effectLst>
+            <a:softEdge rad="112500"/>
+          </a:effectLst>
+          <a:extLst>
+            <a:ext uri="{909E8E84-426E-40DD-AFC4-6F175D3DCCD1}">
+              <a14:hiddenFill xmlns:a14="http://schemas.microsoft.com/office/drawing/2010/main">
+                <a:solidFill>
+                  <a:srgbClr val="FFFFFF"/>
+                </a:solidFill>
+              </a14:hiddenFill>
+            </a:ext>
+          </a:extLst>
+        </p:spPr>
+      </p:pic>
+    </p:spTree>
+    <p:extLst>
+      <p:ext uri="{BB962C8B-B14F-4D97-AF65-F5344CB8AC3E}">
+        <p14:creationId xmlns:p14="http://schemas.microsoft.com/office/powerpoint/2010/main" val="2778767387"/>
       </p:ext>
     </p:extLst>
   </p:cSld>

</xml_diff>